<commit_message>
Add Open and Save tools with dialog functionality and styling
</commit_message>
<xml_diff>
--- a/src/style/ColorPkr-Icons.pptx
+++ b/src/style/ColorPkr-Icons.pptx
@@ -7,6 +7,7 @@
   <p:sldIdLst>
     <p:sldId id="256" r:id="rId2"/>
     <p:sldId id="257" r:id="rId3"/>
+    <p:sldId id="259" r:id="rId4"/>
   </p:sldIdLst>
   <p:sldSz cx="12192000" cy="6858000"/>
   <p:notesSz cx="6858000" cy="9144000"/>
@@ -105,6 +106,11 @@
       </a:defRPr>
     </a:lvl9pPr>
   </p:defaultTextStyle>
+  <p:extLst>
+    <p:ext uri="{EFAFB233-063F-42B5-8137-9DF3F51BA10A}">
+      <p15:sldGuideLst xmlns:p15="http://schemas.microsoft.com/office/powerpoint/2012/main"/>
+    </p:ext>
+  </p:extLst>
 </p:presentation>
 </file>
 
@@ -257,7 +263,7 @@
           <a:p>
             <a:fld id="{127E456F-8AE8-4014-B338-718F1CA4F223}" type="datetimeFigureOut">
               <a:rPr lang="fr-CA" smtClean="0"/>
-              <a:t>2026-02-07</a:t>
+              <a:t>2026-02-09</a:t>
             </a:fld>
             <a:endParaRPr lang="fr-CA"/>
           </a:p>
@@ -457,7 +463,7 @@
           <a:p>
             <a:fld id="{127E456F-8AE8-4014-B338-718F1CA4F223}" type="datetimeFigureOut">
               <a:rPr lang="fr-CA" smtClean="0"/>
-              <a:t>2026-02-07</a:t>
+              <a:t>2026-02-09</a:t>
             </a:fld>
             <a:endParaRPr lang="fr-CA"/>
           </a:p>
@@ -667,7 +673,7 @@
           <a:p>
             <a:fld id="{127E456F-8AE8-4014-B338-718F1CA4F223}" type="datetimeFigureOut">
               <a:rPr lang="fr-CA" smtClean="0"/>
-              <a:t>2026-02-07</a:t>
+              <a:t>2026-02-09</a:t>
             </a:fld>
             <a:endParaRPr lang="fr-CA"/>
           </a:p>
@@ -867,7 +873,7 @@
           <a:p>
             <a:fld id="{127E456F-8AE8-4014-B338-718F1CA4F223}" type="datetimeFigureOut">
               <a:rPr lang="fr-CA" smtClean="0"/>
-              <a:t>2026-02-07</a:t>
+              <a:t>2026-02-09</a:t>
             </a:fld>
             <a:endParaRPr lang="fr-CA"/>
           </a:p>
@@ -1143,7 +1149,7 @@
           <a:p>
             <a:fld id="{127E456F-8AE8-4014-B338-718F1CA4F223}" type="datetimeFigureOut">
               <a:rPr lang="fr-CA" smtClean="0"/>
-              <a:t>2026-02-07</a:t>
+              <a:t>2026-02-09</a:t>
             </a:fld>
             <a:endParaRPr lang="fr-CA"/>
           </a:p>
@@ -1411,7 +1417,7 @@
           <a:p>
             <a:fld id="{127E456F-8AE8-4014-B338-718F1CA4F223}" type="datetimeFigureOut">
               <a:rPr lang="fr-CA" smtClean="0"/>
-              <a:t>2026-02-07</a:t>
+              <a:t>2026-02-09</a:t>
             </a:fld>
             <a:endParaRPr lang="fr-CA"/>
           </a:p>
@@ -1826,7 +1832,7 @@
           <a:p>
             <a:fld id="{127E456F-8AE8-4014-B338-718F1CA4F223}" type="datetimeFigureOut">
               <a:rPr lang="fr-CA" smtClean="0"/>
-              <a:t>2026-02-07</a:t>
+              <a:t>2026-02-09</a:t>
             </a:fld>
             <a:endParaRPr lang="fr-CA"/>
           </a:p>
@@ -1968,7 +1974,7 @@
           <a:p>
             <a:fld id="{127E456F-8AE8-4014-B338-718F1CA4F223}" type="datetimeFigureOut">
               <a:rPr lang="fr-CA" smtClean="0"/>
-              <a:t>2026-02-07</a:t>
+              <a:t>2026-02-09</a:t>
             </a:fld>
             <a:endParaRPr lang="fr-CA"/>
           </a:p>
@@ -2081,7 +2087,7 @@
           <a:p>
             <a:fld id="{127E456F-8AE8-4014-B338-718F1CA4F223}" type="datetimeFigureOut">
               <a:rPr lang="fr-CA" smtClean="0"/>
-              <a:t>2026-02-07</a:t>
+              <a:t>2026-02-09</a:t>
             </a:fld>
             <a:endParaRPr lang="fr-CA"/>
           </a:p>
@@ -2394,7 +2400,7 @@
           <a:p>
             <a:fld id="{127E456F-8AE8-4014-B338-718F1CA4F223}" type="datetimeFigureOut">
               <a:rPr lang="fr-CA" smtClean="0"/>
-              <a:t>2026-02-07</a:t>
+              <a:t>2026-02-09</a:t>
             </a:fld>
             <a:endParaRPr lang="fr-CA"/>
           </a:p>
@@ -2683,7 +2689,7 @@
           <a:p>
             <a:fld id="{127E456F-8AE8-4014-B338-718F1CA4F223}" type="datetimeFigureOut">
               <a:rPr lang="fr-CA" smtClean="0"/>
-              <a:t>2026-02-07</a:t>
+              <a:t>2026-02-09</a:t>
             </a:fld>
             <a:endParaRPr lang="fr-CA"/>
           </a:p>
@@ -2926,7 +2932,7 @@
           <a:p>
             <a:fld id="{127E456F-8AE8-4014-B338-718F1CA4F223}" type="datetimeFigureOut">
               <a:rPr lang="fr-CA" smtClean="0"/>
-              <a:t>2026-02-07</a:t>
+              <a:t>2026-02-09</a:t>
             </a:fld>
             <a:endParaRPr lang="fr-CA"/>
           </a:p>
@@ -3783,6 +3789,309 @@
           </a:p>
         </p:txBody>
       </p:sp>
+      <p:grpSp>
+        <p:nvGrpSpPr>
+          <p:cNvPr id="2" name="Group 1">
+            <a:extLst>
+              <a:ext uri="{FF2B5EF4-FFF2-40B4-BE49-F238E27FC236}">
+                <a16:creationId xmlns:a16="http://schemas.microsoft.com/office/drawing/2014/main" id="{ACB90AC7-CED3-42DE-2711-483D466FDC8D}"/>
+              </a:ext>
+            </a:extLst>
+          </p:cNvPr>
+          <p:cNvGrpSpPr/>
+          <p:nvPr/>
+        </p:nvGrpSpPr>
+        <p:grpSpPr>
+          <a:xfrm>
+            <a:off x="5022038" y="2538961"/>
+            <a:ext cx="1038462" cy="846402"/>
+            <a:chOff x="7707494" y="2865508"/>
+            <a:chExt cx="1038462" cy="846402"/>
+          </a:xfrm>
+        </p:grpSpPr>
+        <p:sp>
+          <p:nvSpPr>
+            <p:cNvPr id="3" name="Rectangle: Top Corners Rounded 2">
+              <a:extLst>
+                <a:ext uri="{FF2B5EF4-FFF2-40B4-BE49-F238E27FC236}">
+                  <a16:creationId xmlns:a16="http://schemas.microsoft.com/office/drawing/2014/main" id="{F0619745-10FD-4D56-13D4-FB9BA2F8A879}"/>
+                </a:ext>
+              </a:extLst>
+            </p:cNvPr>
+            <p:cNvSpPr/>
+            <p:nvPr/>
+          </p:nvSpPr>
+          <p:spPr>
+            <a:xfrm>
+              <a:off x="7707494" y="3147653"/>
+              <a:ext cx="841194" cy="564257"/>
+            </a:xfrm>
+            <a:prstGeom prst="round2SameRect">
+              <a:avLst/>
+            </a:prstGeom>
+            <a:solidFill>
+              <a:srgbClr val="5F5F5F"/>
+            </a:solidFill>
+            <a:ln>
+              <a:noFill/>
+            </a:ln>
+          </p:spPr>
+          <p:style>
+            <a:lnRef idx="2">
+              <a:schemeClr val="accent1">
+                <a:shade val="15000"/>
+              </a:schemeClr>
+            </a:lnRef>
+            <a:fillRef idx="1">
+              <a:schemeClr val="accent1"/>
+            </a:fillRef>
+            <a:effectRef idx="0">
+              <a:schemeClr val="accent1"/>
+            </a:effectRef>
+            <a:fontRef idx="minor">
+              <a:schemeClr val="lt1"/>
+            </a:fontRef>
+          </p:style>
+          <p:txBody>
+            <a:bodyPr rtlCol="0" anchor="ctr"/>
+            <a:lstStyle/>
+            <a:p>
+              <a:pPr algn="ctr"/>
+              <a:endParaRPr lang="fr-CA"/>
+            </a:p>
+          </p:txBody>
+        </p:sp>
+        <p:sp>
+          <p:nvSpPr>
+            <p:cNvPr id="13" name="Rectangle 12">
+              <a:extLst>
+                <a:ext uri="{FF2B5EF4-FFF2-40B4-BE49-F238E27FC236}">
+                  <a16:creationId xmlns:a16="http://schemas.microsoft.com/office/drawing/2014/main" id="{0707F7AF-1BA1-546A-A575-5D7F8144921C}"/>
+                </a:ext>
+              </a:extLst>
+            </p:cNvPr>
+            <p:cNvSpPr/>
+            <p:nvPr/>
+          </p:nvSpPr>
+          <p:spPr>
+            <a:xfrm>
+              <a:off x="7806128" y="2865508"/>
+              <a:ext cx="841194" cy="649582"/>
+            </a:xfrm>
+            <a:prstGeom prst="rect">
+              <a:avLst/>
+            </a:prstGeom>
+            <a:solidFill>
+              <a:schemeClr val="bg1"/>
+            </a:solidFill>
+            <a:ln>
+              <a:noFill/>
+            </a:ln>
+          </p:spPr>
+          <p:style>
+            <a:lnRef idx="2">
+              <a:schemeClr val="accent1">
+                <a:shade val="15000"/>
+              </a:schemeClr>
+            </a:lnRef>
+            <a:fillRef idx="1">
+              <a:schemeClr val="accent1"/>
+            </a:fillRef>
+            <a:effectRef idx="0">
+              <a:schemeClr val="accent1"/>
+            </a:effectRef>
+            <a:fontRef idx="minor">
+              <a:schemeClr val="lt1"/>
+            </a:fontRef>
+          </p:style>
+          <p:txBody>
+            <a:bodyPr rtlCol="0" anchor="ctr"/>
+            <a:lstStyle/>
+            <a:p>
+              <a:pPr algn="ctr"/>
+              <a:endParaRPr lang="fr-CA"/>
+            </a:p>
+          </p:txBody>
+        </p:sp>
+        <p:sp>
+          <p:nvSpPr>
+            <p:cNvPr id="14" name="Arrow: Up 13">
+              <a:extLst>
+                <a:ext uri="{FF2B5EF4-FFF2-40B4-BE49-F238E27FC236}">
+                  <a16:creationId xmlns:a16="http://schemas.microsoft.com/office/drawing/2014/main" id="{A55AA800-6C8A-B3F2-C388-D3D27DB6C57B}"/>
+                </a:ext>
+              </a:extLst>
+            </p:cNvPr>
+            <p:cNvSpPr/>
+            <p:nvPr/>
+          </p:nvSpPr>
+          <p:spPr>
+            <a:xfrm>
+              <a:off x="8043629" y="2964253"/>
+              <a:ext cx="402462" cy="339202"/>
+            </a:xfrm>
+            <a:prstGeom prst="upArrow">
+              <a:avLst/>
+            </a:prstGeom>
+            <a:solidFill>
+              <a:srgbClr val="CCCCCC"/>
+            </a:solidFill>
+            <a:ln>
+              <a:noFill/>
+            </a:ln>
+          </p:spPr>
+          <p:style>
+            <a:lnRef idx="2">
+              <a:schemeClr val="accent1">
+                <a:shade val="15000"/>
+              </a:schemeClr>
+            </a:lnRef>
+            <a:fillRef idx="1">
+              <a:schemeClr val="accent1"/>
+            </a:fillRef>
+            <a:effectRef idx="0">
+              <a:schemeClr val="accent1"/>
+            </a:effectRef>
+            <a:fontRef idx="minor">
+              <a:schemeClr val="lt1"/>
+            </a:fontRef>
+          </p:style>
+          <p:txBody>
+            <a:bodyPr rtlCol="0" anchor="ctr"/>
+            <a:lstStyle/>
+            <a:p>
+              <a:pPr algn="ctr"/>
+              <a:endParaRPr lang="fr-CA"/>
+            </a:p>
+          </p:txBody>
+        </p:sp>
+        <p:sp>
+          <p:nvSpPr>
+            <p:cNvPr id="15" name="Freeform: Shape 14">
+              <a:extLst>
+                <a:ext uri="{FF2B5EF4-FFF2-40B4-BE49-F238E27FC236}">
+                  <a16:creationId xmlns:a16="http://schemas.microsoft.com/office/drawing/2014/main" id="{45488EF2-C2D9-9748-BB5B-A921567C0A41}"/>
+                </a:ext>
+              </a:extLst>
+            </p:cNvPr>
+            <p:cNvSpPr/>
+            <p:nvPr/>
+          </p:nvSpPr>
+          <p:spPr>
+            <a:xfrm>
+              <a:off x="7707494" y="3227294"/>
+              <a:ext cx="1038462" cy="484616"/>
+            </a:xfrm>
+            <a:custGeom>
+              <a:avLst/>
+              <a:gdLst>
+                <a:gd name="csX0" fmla="*/ 714375 w 714375"/>
+                <a:gd name="csY0" fmla="*/ 38100 h 333375"/>
+                <a:gd name="csX1" fmla="*/ 680085 w 714375"/>
+                <a:gd name="csY1" fmla="*/ 0 h 333375"/>
+                <a:gd name="csX2" fmla="*/ 160973 w 714375"/>
+                <a:gd name="csY2" fmla="*/ 0 h 333375"/>
+                <a:gd name="csX3" fmla="*/ 128588 w 714375"/>
+                <a:gd name="csY3" fmla="*/ 20955 h 333375"/>
+                <a:gd name="csX4" fmla="*/ 0 w 714375"/>
+                <a:gd name="csY4" fmla="*/ 333375 h 333375"/>
+                <a:gd name="csX5" fmla="*/ 581025 w 714375"/>
+                <a:gd name="csY5" fmla="*/ 333375 h 333375"/>
+                <a:gd name="csX6" fmla="*/ 710565 w 714375"/>
+                <a:gd name="csY6" fmla="*/ 55245 h 333375"/>
+                <a:gd name="csX7" fmla="*/ 714375 w 714375"/>
+                <a:gd name="csY7" fmla="*/ 38100 h 333375"/>
+                <a:gd name="csX8" fmla="*/ 714375 w 714375"/>
+                <a:gd name="csY8" fmla="*/ 38100 h 333375"/>
+              </a:gdLst>
+              <a:ahLst/>
+              <a:cxnLst>
+                <a:cxn ang="0">
+                  <a:pos x="csX0" y="csY0"/>
+                </a:cxn>
+                <a:cxn ang="0">
+                  <a:pos x="csX1" y="csY1"/>
+                </a:cxn>
+                <a:cxn ang="0">
+                  <a:pos x="csX2" y="csY2"/>
+                </a:cxn>
+                <a:cxn ang="0">
+                  <a:pos x="csX3" y="csY3"/>
+                </a:cxn>
+                <a:cxn ang="0">
+                  <a:pos x="csX4" y="csY4"/>
+                </a:cxn>
+                <a:cxn ang="0">
+                  <a:pos x="csX5" y="csY5"/>
+                </a:cxn>
+                <a:cxn ang="0">
+                  <a:pos x="csX6" y="csY6"/>
+                </a:cxn>
+                <a:cxn ang="0">
+                  <a:pos x="csX7" y="csY7"/>
+                </a:cxn>
+                <a:cxn ang="0">
+                  <a:pos x="csX8" y="csY8"/>
+                </a:cxn>
+              </a:cxnLst>
+              <a:rect l="l" t="t" r="r" b="b"/>
+              <a:pathLst>
+                <a:path w="714375" h="333375">
+                  <a:moveTo>
+                    <a:pt x="714375" y="38100"/>
+                  </a:moveTo>
+                  <a:cubicBezTo>
+                    <a:pt x="714375" y="18098"/>
+                    <a:pt x="700088" y="1905"/>
+                    <a:pt x="680085" y="0"/>
+                  </a:cubicBezTo>
+                  <a:lnTo>
+                    <a:pt x="160973" y="0"/>
+                  </a:lnTo>
+                  <a:cubicBezTo>
+                    <a:pt x="146685" y="0"/>
+                    <a:pt x="134303" y="8573"/>
+                    <a:pt x="128588" y="20955"/>
+                  </a:cubicBezTo>
+                  <a:lnTo>
+                    <a:pt x="0" y="333375"/>
+                  </a:lnTo>
+                  <a:lnTo>
+                    <a:pt x="581025" y="333375"/>
+                  </a:lnTo>
+                  <a:lnTo>
+                    <a:pt x="710565" y="55245"/>
+                  </a:lnTo>
+                  <a:cubicBezTo>
+                    <a:pt x="713423" y="49530"/>
+                    <a:pt x="714375" y="43815"/>
+                    <a:pt x="714375" y="38100"/>
+                  </a:cubicBezTo>
+                  <a:lnTo>
+                    <a:pt x="714375" y="38100"/>
+                  </a:lnTo>
+                  <a:close/>
+                </a:path>
+              </a:pathLst>
+            </a:custGeom>
+            <a:solidFill>
+              <a:srgbClr val="999999"/>
+            </a:solidFill>
+            <a:ln w="9525" cap="flat">
+              <a:noFill/>
+              <a:prstDash val="solid"/>
+              <a:miter/>
+            </a:ln>
+          </p:spPr>
+          <p:txBody>
+            <a:bodyPr/>
+            <a:lstStyle/>
+            <a:p>
+              <a:endParaRPr lang="fr-CA" dirty="0"/>
+            </a:p>
+          </p:txBody>
+        </p:sp>
+      </p:grpSp>
     </p:spTree>
     <p:extLst>
       <p:ext uri="{BB962C8B-B14F-4D97-AF65-F5344CB8AC3E}">
@@ -5323,42 +5632,160 @@
           </a:p>
         </p:txBody>
       </p:sp>
-      <p:pic>
-        <p:nvPicPr>
-          <p:cNvPr id="55" name="Graphic 54" descr="Open folder with solid fill">
-            <a:extLst>
-              <a:ext uri="{FF2B5EF4-FFF2-40B4-BE49-F238E27FC236}">
-                <a16:creationId xmlns:a16="http://schemas.microsoft.com/office/drawing/2014/main" id="{549BBEBA-242D-8641-CB24-4EB4409B8758}"/>
-              </a:ext>
-            </a:extLst>
-          </p:cNvPr>
-          <p:cNvPicPr>
-            <a:picLocks noChangeAspect="1"/>
-          </p:cNvPicPr>
+      <p:sp>
+        <p:nvSpPr>
+          <p:cNvPr id="10" name="Freeform: Shape 9">
+            <a:extLst>
+              <a:ext uri="{FF2B5EF4-FFF2-40B4-BE49-F238E27FC236}">
+                <a16:creationId xmlns:a16="http://schemas.microsoft.com/office/drawing/2014/main" id="{C4243FB3-25BE-A057-A83D-8FE765E0CF86}"/>
+              </a:ext>
+            </a:extLst>
+          </p:cNvPr>
+          <p:cNvSpPr/>
           <p:nvPr/>
-        </p:nvPicPr>
-        <p:blipFill>
-          <a:blip r:embed="rId2">
-            <a:extLst>
-              <a:ext uri="{96DAC541-7B7A-43D3-8B79-37D633B846F1}">
-                <asvg:svgBlip xmlns:asvg="http://schemas.microsoft.com/office/drawing/2016/SVG/main" r:embed="rId3"/>
-              </a:ext>
-            </a:extLst>
-          </a:blip>
-          <a:stretch>
-            <a:fillRect/>
-          </a:stretch>
-        </p:blipFill>
+        </p:nvSpPr>
         <p:spPr>
           <a:xfrm>
-            <a:off x="7576177" y="3191118"/>
-            <a:ext cx="914400" cy="914400"/>
+            <a:off x="7661902" y="3381618"/>
+            <a:ext cx="666750" cy="504834"/>
           </a:xfrm>
-          <a:prstGeom prst="rect">
+          <a:custGeom>
             <a:avLst/>
-          </a:prstGeom>
+            <a:gdLst>
+              <a:gd name="csX0" fmla="*/ 189548 w 666750"/>
+              <a:gd name="csY0" fmla="*/ 161925 h 504834"/>
+              <a:gd name="csX1" fmla="*/ 666750 w 666750"/>
+              <a:gd name="csY1" fmla="*/ 161925 h 504834"/>
+              <a:gd name="csX2" fmla="*/ 666750 w 666750"/>
+              <a:gd name="csY2" fmla="*/ 114300 h 504834"/>
+              <a:gd name="csX3" fmla="*/ 628650 w 666750"/>
+              <a:gd name="csY3" fmla="*/ 76200 h 504834"/>
+              <a:gd name="csX4" fmla="*/ 342900 w 666750"/>
+              <a:gd name="csY4" fmla="*/ 76200 h 504834"/>
+              <a:gd name="csX5" fmla="*/ 238125 w 666750"/>
+              <a:gd name="csY5" fmla="*/ 6668 h 504834"/>
+              <a:gd name="csX6" fmla="*/ 217170 w 666750"/>
+              <a:gd name="csY6" fmla="*/ 0 h 504834"/>
+              <a:gd name="csX7" fmla="*/ 38100 w 666750"/>
+              <a:gd name="csY7" fmla="*/ 0 h 504834"/>
+              <a:gd name="csX8" fmla="*/ 0 w 666750"/>
+              <a:gd name="csY8" fmla="*/ 38100 h 504834"/>
+              <a:gd name="csX9" fmla="*/ 0 w 666750"/>
+              <a:gd name="csY9" fmla="*/ 504825 h 504834"/>
+              <a:gd name="csX10" fmla="*/ 122873 w 666750"/>
+              <a:gd name="csY10" fmla="*/ 206693 h 504834"/>
+              <a:gd name="csX11" fmla="*/ 189548 w 666750"/>
+              <a:gd name="csY11" fmla="*/ 161925 h 504834"/>
+            </a:gdLst>
+            <a:ahLst/>
+            <a:cxnLst>
+              <a:cxn ang="0">
+                <a:pos x="csX0" y="csY0"/>
+              </a:cxn>
+              <a:cxn ang="0">
+                <a:pos x="csX1" y="csY1"/>
+              </a:cxn>
+              <a:cxn ang="0">
+                <a:pos x="csX2" y="csY2"/>
+              </a:cxn>
+              <a:cxn ang="0">
+                <a:pos x="csX3" y="csY3"/>
+              </a:cxn>
+              <a:cxn ang="0">
+                <a:pos x="csX4" y="csY4"/>
+              </a:cxn>
+              <a:cxn ang="0">
+                <a:pos x="csX5" y="csY5"/>
+              </a:cxn>
+              <a:cxn ang="0">
+                <a:pos x="csX6" y="csY6"/>
+              </a:cxn>
+              <a:cxn ang="0">
+                <a:pos x="csX7" y="csY7"/>
+              </a:cxn>
+              <a:cxn ang="0">
+                <a:pos x="csX8" y="csY8"/>
+              </a:cxn>
+              <a:cxn ang="0">
+                <a:pos x="csX9" y="csY9"/>
+              </a:cxn>
+              <a:cxn ang="0">
+                <a:pos x="csX10" y="csY10"/>
+              </a:cxn>
+              <a:cxn ang="0">
+                <a:pos x="csX11" y="csY11"/>
+              </a:cxn>
+            </a:cxnLst>
+            <a:rect l="l" t="t" r="r" b="b"/>
+            <a:pathLst>
+              <a:path w="666750" h="504834">
+                <a:moveTo>
+                  <a:pt x="189548" y="161925"/>
+                </a:moveTo>
+                <a:lnTo>
+                  <a:pt x="666750" y="161925"/>
+                </a:lnTo>
+                <a:lnTo>
+                  <a:pt x="666750" y="114300"/>
+                </a:lnTo>
+                <a:cubicBezTo>
+                  <a:pt x="666750" y="93345"/>
+                  <a:pt x="649605" y="76200"/>
+                  <a:pt x="628650" y="76200"/>
+                </a:cubicBezTo>
+                <a:lnTo>
+                  <a:pt x="342900" y="76200"/>
+                </a:lnTo>
+                <a:lnTo>
+                  <a:pt x="238125" y="6668"/>
+                </a:lnTo>
+                <a:cubicBezTo>
+                  <a:pt x="231458" y="2857"/>
+                  <a:pt x="224790" y="0"/>
+                  <a:pt x="217170" y="0"/>
+                </a:cubicBezTo>
+                <a:lnTo>
+                  <a:pt x="38100" y="0"/>
+                </a:lnTo>
+                <a:cubicBezTo>
+                  <a:pt x="17145" y="0"/>
+                  <a:pt x="0" y="17145"/>
+                  <a:pt x="0" y="38100"/>
+                </a:cubicBezTo>
+                <a:lnTo>
+                  <a:pt x="0" y="504825"/>
+                </a:lnTo>
+                <a:cubicBezTo>
+                  <a:pt x="0" y="506730"/>
+                  <a:pt x="122873" y="206693"/>
+                  <a:pt x="122873" y="206693"/>
+                </a:cubicBezTo>
+                <a:cubicBezTo>
+                  <a:pt x="134303" y="180023"/>
+                  <a:pt x="160020" y="161925"/>
+                  <a:pt x="189548" y="161925"/>
+                </a:cubicBezTo>
+                <a:close/>
+              </a:path>
+            </a:pathLst>
+          </a:custGeom>
+          <a:solidFill>
+            <a:srgbClr val="333333"/>
+          </a:solidFill>
+          <a:ln w="9525" cap="flat">
+            <a:noFill/>
+            <a:prstDash val="solid"/>
+            <a:miter/>
+          </a:ln>
         </p:spPr>
-      </p:pic>
+        <p:txBody>
+          <a:bodyPr/>
+          <a:lstStyle/>
+          <a:p>
+            <a:endParaRPr lang="fr-CA"/>
+          </a:p>
+        </p:txBody>
+      </p:sp>
       <p:grpSp>
         <p:nvGrpSpPr>
           <p:cNvPr id="66" name="Group 65">
@@ -5762,10 +6189,1951 @@
           </p:txBody>
         </p:sp>
       </p:grpSp>
+      <p:sp>
+        <p:nvSpPr>
+          <p:cNvPr id="7" name="Freeform: Shape 6">
+            <a:extLst>
+              <a:ext uri="{FF2B5EF4-FFF2-40B4-BE49-F238E27FC236}">
+                <a16:creationId xmlns:a16="http://schemas.microsoft.com/office/drawing/2014/main" id="{891C271F-9945-7BC7-C812-63BB9082D64B}"/>
+              </a:ext>
+            </a:extLst>
+          </p:cNvPr>
+          <p:cNvSpPr/>
+          <p:nvPr/>
+        </p:nvSpPr>
+        <p:spPr>
+          <a:xfrm>
+            <a:off x="7086915" y="4637381"/>
+            <a:ext cx="666750" cy="504834"/>
+          </a:xfrm>
+          <a:custGeom>
+            <a:avLst/>
+            <a:gdLst>
+              <a:gd name="csX0" fmla="*/ 189548 w 666750"/>
+              <a:gd name="csY0" fmla="*/ 161925 h 504834"/>
+              <a:gd name="csX1" fmla="*/ 666750 w 666750"/>
+              <a:gd name="csY1" fmla="*/ 161925 h 504834"/>
+              <a:gd name="csX2" fmla="*/ 666750 w 666750"/>
+              <a:gd name="csY2" fmla="*/ 114300 h 504834"/>
+              <a:gd name="csX3" fmla="*/ 628650 w 666750"/>
+              <a:gd name="csY3" fmla="*/ 76200 h 504834"/>
+              <a:gd name="csX4" fmla="*/ 342900 w 666750"/>
+              <a:gd name="csY4" fmla="*/ 76200 h 504834"/>
+              <a:gd name="csX5" fmla="*/ 238125 w 666750"/>
+              <a:gd name="csY5" fmla="*/ 6668 h 504834"/>
+              <a:gd name="csX6" fmla="*/ 217170 w 666750"/>
+              <a:gd name="csY6" fmla="*/ 0 h 504834"/>
+              <a:gd name="csX7" fmla="*/ 38100 w 666750"/>
+              <a:gd name="csY7" fmla="*/ 0 h 504834"/>
+              <a:gd name="csX8" fmla="*/ 0 w 666750"/>
+              <a:gd name="csY8" fmla="*/ 38100 h 504834"/>
+              <a:gd name="csX9" fmla="*/ 0 w 666750"/>
+              <a:gd name="csY9" fmla="*/ 504825 h 504834"/>
+              <a:gd name="csX10" fmla="*/ 122873 w 666750"/>
+              <a:gd name="csY10" fmla="*/ 206693 h 504834"/>
+              <a:gd name="csX11" fmla="*/ 189548 w 666750"/>
+              <a:gd name="csY11" fmla="*/ 161925 h 504834"/>
+            </a:gdLst>
+            <a:ahLst/>
+            <a:cxnLst>
+              <a:cxn ang="0">
+                <a:pos x="csX0" y="csY0"/>
+              </a:cxn>
+              <a:cxn ang="0">
+                <a:pos x="csX1" y="csY1"/>
+              </a:cxn>
+              <a:cxn ang="0">
+                <a:pos x="csX2" y="csY2"/>
+              </a:cxn>
+              <a:cxn ang="0">
+                <a:pos x="csX3" y="csY3"/>
+              </a:cxn>
+              <a:cxn ang="0">
+                <a:pos x="csX4" y="csY4"/>
+              </a:cxn>
+              <a:cxn ang="0">
+                <a:pos x="csX5" y="csY5"/>
+              </a:cxn>
+              <a:cxn ang="0">
+                <a:pos x="csX6" y="csY6"/>
+              </a:cxn>
+              <a:cxn ang="0">
+                <a:pos x="csX7" y="csY7"/>
+              </a:cxn>
+              <a:cxn ang="0">
+                <a:pos x="csX8" y="csY8"/>
+              </a:cxn>
+              <a:cxn ang="0">
+                <a:pos x="csX9" y="csY9"/>
+              </a:cxn>
+              <a:cxn ang="0">
+                <a:pos x="csX10" y="csY10"/>
+              </a:cxn>
+              <a:cxn ang="0">
+                <a:pos x="csX11" y="csY11"/>
+              </a:cxn>
+            </a:cxnLst>
+            <a:rect l="l" t="t" r="r" b="b"/>
+            <a:pathLst>
+              <a:path w="666750" h="504834">
+                <a:moveTo>
+                  <a:pt x="189548" y="161925"/>
+                </a:moveTo>
+                <a:lnTo>
+                  <a:pt x="666750" y="161925"/>
+                </a:lnTo>
+                <a:lnTo>
+                  <a:pt x="666750" y="114300"/>
+                </a:lnTo>
+                <a:cubicBezTo>
+                  <a:pt x="666750" y="93345"/>
+                  <a:pt x="649605" y="76200"/>
+                  <a:pt x="628650" y="76200"/>
+                </a:cubicBezTo>
+                <a:lnTo>
+                  <a:pt x="342900" y="76200"/>
+                </a:lnTo>
+                <a:lnTo>
+                  <a:pt x="238125" y="6668"/>
+                </a:lnTo>
+                <a:cubicBezTo>
+                  <a:pt x="231458" y="2857"/>
+                  <a:pt x="224790" y="0"/>
+                  <a:pt x="217170" y="0"/>
+                </a:cubicBezTo>
+                <a:lnTo>
+                  <a:pt x="38100" y="0"/>
+                </a:lnTo>
+                <a:cubicBezTo>
+                  <a:pt x="17145" y="0"/>
+                  <a:pt x="0" y="17145"/>
+                  <a:pt x="0" y="38100"/>
+                </a:cubicBezTo>
+                <a:lnTo>
+                  <a:pt x="0" y="504825"/>
+                </a:lnTo>
+                <a:cubicBezTo>
+                  <a:pt x="0" y="506730"/>
+                  <a:pt x="122873" y="206693"/>
+                  <a:pt x="122873" y="206693"/>
+                </a:cubicBezTo>
+                <a:cubicBezTo>
+                  <a:pt x="134303" y="180023"/>
+                  <a:pt x="160020" y="161925"/>
+                  <a:pt x="189548" y="161925"/>
+                </a:cubicBezTo>
+                <a:close/>
+              </a:path>
+            </a:pathLst>
+          </a:custGeom>
+          <a:solidFill>
+            <a:srgbClr val="000000"/>
+          </a:solidFill>
+          <a:ln w="9525" cap="flat">
+            <a:noFill/>
+            <a:prstDash val="solid"/>
+            <a:miter/>
+          </a:ln>
+        </p:spPr>
+        <p:txBody>
+          <a:bodyPr/>
+          <a:lstStyle/>
+          <a:p>
+            <a:endParaRPr lang="fr-CA"/>
+          </a:p>
+        </p:txBody>
+      </p:sp>
+      <p:sp>
+        <p:nvSpPr>
+          <p:cNvPr id="8" name="Freeform: Shape 7">
+            <a:extLst>
+              <a:ext uri="{FF2B5EF4-FFF2-40B4-BE49-F238E27FC236}">
+                <a16:creationId xmlns:a16="http://schemas.microsoft.com/office/drawing/2014/main" id="{FD4B82A8-5073-305E-832B-D66B26ADEB32}"/>
+              </a:ext>
+            </a:extLst>
+          </p:cNvPr>
+          <p:cNvSpPr/>
+          <p:nvPr/>
+        </p:nvSpPr>
+        <p:spPr>
+          <a:xfrm>
+            <a:off x="7115490" y="4837406"/>
+            <a:ext cx="714375" cy="333375"/>
+          </a:xfrm>
+          <a:custGeom>
+            <a:avLst/>
+            <a:gdLst>
+              <a:gd name="csX0" fmla="*/ 714375 w 714375"/>
+              <a:gd name="csY0" fmla="*/ 38100 h 333375"/>
+              <a:gd name="csX1" fmla="*/ 680085 w 714375"/>
+              <a:gd name="csY1" fmla="*/ 0 h 333375"/>
+              <a:gd name="csX2" fmla="*/ 160973 w 714375"/>
+              <a:gd name="csY2" fmla="*/ 0 h 333375"/>
+              <a:gd name="csX3" fmla="*/ 128588 w 714375"/>
+              <a:gd name="csY3" fmla="*/ 20955 h 333375"/>
+              <a:gd name="csX4" fmla="*/ 0 w 714375"/>
+              <a:gd name="csY4" fmla="*/ 333375 h 333375"/>
+              <a:gd name="csX5" fmla="*/ 581025 w 714375"/>
+              <a:gd name="csY5" fmla="*/ 333375 h 333375"/>
+              <a:gd name="csX6" fmla="*/ 710565 w 714375"/>
+              <a:gd name="csY6" fmla="*/ 55245 h 333375"/>
+              <a:gd name="csX7" fmla="*/ 714375 w 714375"/>
+              <a:gd name="csY7" fmla="*/ 38100 h 333375"/>
+              <a:gd name="csX8" fmla="*/ 714375 w 714375"/>
+              <a:gd name="csY8" fmla="*/ 38100 h 333375"/>
+            </a:gdLst>
+            <a:ahLst/>
+            <a:cxnLst>
+              <a:cxn ang="0">
+                <a:pos x="csX0" y="csY0"/>
+              </a:cxn>
+              <a:cxn ang="0">
+                <a:pos x="csX1" y="csY1"/>
+              </a:cxn>
+              <a:cxn ang="0">
+                <a:pos x="csX2" y="csY2"/>
+              </a:cxn>
+              <a:cxn ang="0">
+                <a:pos x="csX3" y="csY3"/>
+              </a:cxn>
+              <a:cxn ang="0">
+                <a:pos x="csX4" y="csY4"/>
+              </a:cxn>
+              <a:cxn ang="0">
+                <a:pos x="csX5" y="csY5"/>
+              </a:cxn>
+              <a:cxn ang="0">
+                <a:pos x="csX6" y="csY6"/>
+              </a:cxn>
+              <a:cxn ang="0">
+                <a:pos x="csX7" y="csY7"/>
+              </a:cxn>
+              <a:cxn ang="0">
+                <a:pos x="csX8" y="csY8"/>
+              </a:cxn>
+            </a:cxnLst>
+            <a:rect l="l" t="t" r="r" b="b"/>
+            <a:pathLst>
+              <a:path w="714375" h="333375">
+                <a:moveTo>
+                  <a:pt x="714375" y="38100"/>
+                </a:moveTo>
+                <a:cubicBezTo>
+                  <a:pt x="714375" y="18098"/>
+                  <a:pt x="700088" y="1905"/>
+                  <a:pt x="680085" y="0"/>
+                </a:cubicBezTo>
+                <a:lnTo>
+                  <a:pt x="160973" y="0"/>
+                </a:lnTo>
+                <a:cubicBezTo>
+                  <a:pt x="146685" y="0"/>
+                  <a:pt x="134303" y="8573"/>
+                  <a:pt x="128588" y="20955"/>
+                </a:cubicBezTo>
+                <a:lnTo>
+                  <a:pt x="0" y="333375"/>
+                </a:lnTo>
+                <a:lnTo>
+                  <a:pt x="581025" y="333375"/>
+                </a:lnTo>
+                <a:lnTo>
+                  <a:pt x="710565" y="55245"/>
+                </a:lnTo>
+                <a:cubicBezTo>
+                  <a:pt x="713423" y="49530"/>
+                  <a:pt x="714375" y="43815"/>
+                  <a:pt x="714375" y="38100"/>
+                </a:cubicBezTo>
+                <a:lnTo>
+                  <a:pt x="714375" y="38100"/>
+                </a:lnTo>
+                <a:close/>
+              </a:path>
+            </a:pathLst>
+          </a:custGeom>
+          <a:solidFill>
+            <a:srgbClr val="000000"/>
+          </a:solidFill>
+          <a:ln w="9525" cap="flat">
+            <a:noFill/>
+            <a:prstDash val="solid"/>
+            <a:miter/>
+          </a:ln>
+        </p:spPr>
+        <p:txBody>
+          <a:bodyPr/>
+          <a:lstStyle/>
+          <a:p>
+            <a:endParaRPr lang="fr-CA"/>
+          </a:p>
+        </p:txBody>
+      </p:sp>
+      <p:sp>
+        <p:nvSpPr>
+          <p:cNvPr id="12" name="Freeform: Shape 11">
+            <a:extLst>
+              <a:ext uri="{FF2B5EF4-FFF2-40B4-BE49-F238E27FC236}">
+                <a16:creationId xmlns:a16="http://schemas.microsoft.com/office/drawing/2014/main" id="{35366BD2-A06E-E735-61DA-A86316B3E372}"/>
+              </a:ext>
+            </a:extLst>
+          </p:cNvPr>
+          <p:cNvSpPr/>
+          <p:nvPr/>
+        </p:nvSpPr>
+        <p:spPr>
+          <a:xfrm>
+            <a:off x="7652377" y="3553077"/>
+            <a:ext cx="714375" cy="333375"/>
+          </a:xfrm>
+          <a:custGeom>
+            <a:avLst/>
+            <a:gdLst>
+              <a:gd name="csX0" fmla="*/ 714375 w 714375"/>
+              <a:gd name="csY0" fmla="*/ 38100 h 333375"/>
+              <a:gd name="csX1" fmla="*/ 680085 w 714375"/>
+              <a:gd name="csY1" fmla="*/ 0 h 333375"/>
+              <a:gd name="csX2" fmla="*/ 160973 w 714375"/>
+              <a:gd name="csY2" fmla="*/ 0 h 333375"/>
+              <a:gd name="csX3" fmla="*/ 128588 w 714375"/>
+              <a:gd name="csY3" fmla="*/ 20955 h 333375"/>
+              <a:gd name="csX4" fmla="*/ 0 w 714375"/>
+              <a:gd name="csY4" fmla="*/ 333375 h 333375"/>
+              <a:gd name="csX5" fmla="*/ 581025 w 714375"/>
+              <a:gd name="csY5" fmla="*/ 333375 h 333375"/>
+              <a:gd name="csX6" fmla="*/ 710565 w 714375"/>
+              <a:gd name="csY6" fmla="*/ 55245 h 333375"/>
+              <a:gd name="csX7" fmla="*/ 714375 w 714375"/>
+              <a:gd name="csY7" fmla="*/ 38100 h 333375"/>
+              <a:gd name="csX8" fmla="*/ 714375 w 714375"/>
+              <a:gd name="csY8" fmla="*/ 38100 h 333375"/>
+            </a:gdLst>
+            <a:ahLst/>
+            <a:cxnLst>
+              <a:cxn ang="0">
+                <a:pos x="csX0" y="csY0"/>
+              </a:cxn>
+              <a:cxn ang="0">
+                <a:pos x="csX1" y="csY1"/>
+              </a:cxn>
+              <a:cxn ang="0">
+                <a:pos x="csX2" y="csY2"/>
+              </a:cxn>
+              <a:cxn ang="0">
+                <a:pos x="csX3" y="csY3"/>
+              </a:cxn>
+              <a:cxn ang="0">
+                <a:pos x="csX4" y="csY4"/>
+              </a:cxn>
+              <a:cxn ang="0">
+                <a:pos x="csX5" y="csY5"/>
+              </a:cxn>
+              <a:cxn ang="0">
+                <a:pos x="csX6" y="csY6"/>
+              </a:cxn>
+              <a:cxn ang="0">
+                <a:pos x="csX7" y="csY7"/>
+              </a:cxn>
+              <a:cxn ang="0">
+                <a:pos x="csX8" y="csY8"/>
+              </a:cxn>
+            </a:cxnLst>
+            <a:rect l="l" t="t" r="r" b="b"/>
+            <a:pathLst>
+              <a:path w="714375" h="333375">
+                <a:moveTo>
+                  <a:pt x="714375" y="38100"/>
+                </a:moveTo>
+                <a:cubicBezTo>
+                  <a:pt x="714375" y="18098"/>
+                  <a:pt x="700088" y="1905"/>
+                  <a:pt x="680085" y="0"/>
+                </a:cubicBezTo>
+                <a:lnTo>
+                  <a:pt x="160973" y="0"/>
+                </a:lnTo>
+                <a:cubicBezTo>
+                  <a:pt x="146685" y="0"/>
+                  <a:pt x="134303" y="8573"/>
+                  <a:pt x="128588" y="20955"/>
+                </a:cubicBezTo>
+                <a:lnTo>
+                  <a:pt x="0" y="333375"/>
+                </a:lnTo>
+                <a:lnTo>
+                  <a:pt x="581025" y="333375"/>
+                </a:lnTo>
+                <a:lnTo>
+                  <a:pt x="710565" y="55245"/>
+                </a:lnTo>
+                <a:cubicBezTo>
+                  <a:pt x="713423" y="49530"/>
+                  <a:pt x="714375" y="43815"/>
+                  <a:pt x="714375" y="38100"/>
+                </a:cubicBezTo>
+                <a:lnTo>
+                  <a:pt x="714375" y="38100"/>
+                </a:lnTo>
+                <a:close/>
+              </a:path>
+            </a:pathLst>
+          </a:custGeom>
+          <a:solidFill>
+            <a:srgbClr val="FFFFFF"/>
+          </a:solidFill>
+          <a:ln w="9525" cap="flat">
+            <a:noFill/>
+            <a:prstDash val="solid"/>
+            <a:miter/>
+          </a:ln>
+        </p:spPr>
+        <p:txBody>
+          <a:bodyPr/>
+          <a:lstStyle/>
+          <a:p>
+            <a:endParaRPr lang="fr-CA"/>
+          </a:p>
+        </p:txBody>
+      </p:sp>
+      <p:sp>
+        <p:nvSpPr>
+          <p:cNvPr id="11" name="Freeform: Shape 10">
+            <a:extLst>
+              <a:ext uri="{FF2B5EF4-FFF2-40B4-BE49-F238E27FC236}">
+                <a16:creationId xmlns:a16="http://schemas.microsoft.com/office/drawing/2014/main" id="{4BF8CBDB-BF99-0EC1-041D-46821D3A201B}"/>
+              </a:ext>
+            </a:extLst>
+          </p:cNvPr>
+          <p:cNvSpPr/>
+          <p:nvPr/>
+        </p:nvSpPr>
+        <p:spPr>
+          <a:xfrm>
+            <a:off x="7690477" y="3581643"/>
+            <a:ext cx="714375" cy="333375"/>
+          </a:xfrm>
+          <a:custGeom>
+            <a:avLst/>
+            <a:gdLst>
+              <a:gd name="csX0" fmla="*/ 714375 w 714375"/>
+              <a:gd name="csY0" fmla="*/ 38100 h 333375"/>
+              <a:gd name="csX1" fmla="*/ 680085 w 714375"/>
+              <a:gd name="csY1" fmla="*/ 0 h 333375"/>
+              <a:gd name="csX2" fmla="*/ 160973 w 714375"/>
+              <a:gd name="csY2" fmla="*/ 0 h 333375"/>
+              <a:gd name="csX3" fmla="*/ 128588 w 714375"/>
+              <a:gd name="csY3" fmla="*/ 20955 h 333375"/>
+              <a:gd name="csX4" fmla="*/ 0 w 714375"/>
+              <a:gd name="csY4" fmla="*/ 333375 h 333375"/>
+              <a:gd name="csX5" fmla="*/ 581025 w 714375"/>
+              <a:gd name="csY5" fmla="*/ 333375 h 333375"/>
+              <a:gd name="csX6" fmla="*/ 710565 w 714375"/>
+              <a:gd name="csY6" fmla="*/ 55245 h 333375"/>
+              <a:gd name="csX7" fmla="*/ 714375 w 714375"/>
+              <a:gd name="csY7" fmla="*/ 38100 h 333375"/>
+              <a:gd name="csX8" fmla="*/ 714375 w 714375"/>
+              <a:gd name="csY8" fmla="*/ 38100 h 333375"/>
+            </a:gdLst>
+            <a:ahLst/>
+            <a:cxnLst>
+              <a:cxn ang="0">
+                <a:pos x="csX0" y="csY0"/>
+              </a:cxn>
+              <a:cxn ang="0">
+                <a:pos x="csX1" y="csY1"/>
+              </a:cxn>
+              <a:cxn ang="0">
+                <a:pos x="csX2" y="csY2"/>
+              </a:cxn>
+              <a:cxn ang="0">
+                <a:pos x="csX3" y="csY3"/>
+              </a:cxn>
+              <a:cxn ang="0">
+                <a:pos x="csX4" y="csY4"/>
+              </a:cxn>
+              <a:cxn ang="0">
+                <a:pos x="csX5" y="csY5"/>
+              </a:cxn>
+              <a:cxn ang="0">
+                <a:pos x="csX6" y="csY6"/>
+              </a:cxn>
+              <a:cxn ang="0">
+                <a:pos x="csX7" y="csY7"/>
+              </a:cxn>
+              <a:cxn ang="0">
+                <a:pos x="csX8" y="csY8"/>
+              </a:cxn>
+            </a:cxnLst>
+            <a:rect l="l" t="t" r="r" b="b"/>
+            <a:pathLst>
+              <a:path w="714375" h="333375">
+                <a:moveTo>
+                  <a:pt x="714375" y="38100"/>
+                </a:moveTo>
+                <a:cubicBezTo>
+                  <a:pt x="714375" y="18098"/>
+                  <a:pt x="700088" y="1905"/>
+                  <a:pt x="680085" y="0"/>
+                </a:cubicBezTo>
+                <a:lnTo>
+                  <a:pt x="160973" y="0"/>
+                </a:lnTo>
+                <a:cubicBezTo>
+                  <a:pt x="146685" y="0"/>
+                  <a:pt x="134303" y="8573"/>
+                  <a:pt x="128588" y="20955"/>
+                </a:cubicBezTo>
+                <a:lnTo>
+                  <a:pt x="0" y="333375"/>
+                </a:lnTo>
+                <a:lnTo>
+                  <a:pt x="581025" y="333375"/>
+                </a:lnTo>
+                <a:lnTo>
+                  <a:pt x="710565" y="55245"/>
+                </a:lnTo>
+                <a:cubicBezTo>
+                  <a:pt x="713423" y="49530"/>
+                  <a:pt x="714375" y="43815"/>
+                  <a:pt x="714375" y="38100"/>
+                </a:cubicBezTo>
+                <a:lnTo>
+                  <a:pt x="714375" y="38100"/>
+                </a:lnTo>
+                <a:close/>
+              </a:path>
+            </a:pathLst>
+          </a:custGeom>
+          <a:solidFill>
+            <a:srgbClr val="999999"/>
+          </a:solidFill>
+          <a:ln w="9525" cap="flat">
+            <a:noFill/>
+            <a:prstDash val="solid"/>
+            <a:miter/>
+          </a:ln>
+        </p:spPr>
+        <p:txBody>
+          <a:bodyPr/>
+          <a:lstStyle/>
+          <a:p>
+            <a:endParaRPr lang="fr-CA"/>
+          </a:p>
+        </p:txBody>
+      </p:sp>
+      <p:grpSp>
+        <p:nvGrpSpPr>
+          <p:cNvPr id="16" name="Group 15">
+            <a:extLst>
+              <a:ext uri="{FF2B5EF4-FFF2-40B4-BE49-F238E27FC236}">
+                <a16:creationId xmlns:a16="http://schemas.microsoft.com/office/drawing/2014/main" id="{A116056B-E9C2-6557-80DD-7169BC56A8B3}"/>
+              </a:ext>
+            </a:extLst>
+          </p:cNvPr>
+          <p:cNvGrpSpPr>
+            <a:grpSpLocks noChangeAspect="1"/>
+          </p:cNvGrpSpPr>
+          <p:nvPr/>
+        </p:nvGrpSpPr>
+        <p:grpSpPr>
+          <a:xfrm>
+            <a:off x="9293195" y="2690125"/>
+            <a:ext cx="1080000" cy="775385"/>
+            <a:chOff x="3477276" y="354071"/>
+            <a:chExt cx="7480273" cy="5370453"/>
+          </a:xfrm>
+        </p:grpSpPr>
+        <p:sp>
+          <p:nvSpPr>
+            <p:cNvPr id="17" name="Freeform: Shape 16">
+              <a:extLst>
+                <a:ext uri="{FF2B5EF4-FFF2-40B4-BE49-F238E27FC236}">
+                  <a16:creationId xmlns:a16="http://schemas.microsoft.com/office/drawing/2014/main" id="{63A3F379-ADE8-C1F1-CF1A-8C34F73418B0}"/>
+                </a:ext>
+              </a:extLst>
+            </p:cNvPr>
+            <p:cNvSpPr/>
+            <p:nvPr/>
+          </p:nvSpPr>
+          <p:spPr>
+            <a:xfrm>
+              <a:off x="3477276" y="354071"/>
+              <a:ext cx="6713066" cy="5082841"/>
+            </a:xfrm>
+            <a:custGeom>
+              <a:avLst/>
+              <a:gdLst>
+                <a:gd name="csX0" fmla="*/ 189548 w 666750"/>
+                <a:gd name="csY0" fmla="*/ 161925 h 504834"/>
+                <a:gd name="csX1" fmla="*/ 666750 w 666750"/>
+                <a:gd name="csY1" fmla="*/ 161925 h 504834"/>
+                <a:gd name="csX2" fmla="*/ 666750 w 666750"/>
+                <a:gd name="csY2" fmla="*/ 114300 h 504834"/>
+                <a:gd name="csX3" fmla="*/ 628650 w 666750"/>
+                <a:gd name="csY3" fmla="*/ 76200 h 504834"/>
+                <a:gd name="csX4" fmla="*/ 342900 w 666750"/>
+                <a:gd name="csY4" fmla="*/ 76200 h 504834"/>
+                <a:gd name="csX5" fmla="*/ 238125 w 666750"/>
+                <a:gd name="csY5" fmla="*/ 6668 h 504834"/>
+                <a:gd name="csX6" fmla="*/ 217170 w 666750"/>
+                <a:gd name="csY6" fmla="*/ 0 h 504834"/>
+                <a:gd name="csX7" fmla="*/ 38100 w 666750"/>
+                <a:gd name="csY7" fmla="*/ 0 h 504834"/>
+                <a:gd name="csX8" fmla="*/ 0 w 666750"/>
+                <a:gd name="csY8" fmla="*/ 38100 h 504834"/>
+                <a:gd name="csX9" fmla="*/ 0 w 666750"/>
+                <a:gd name="csY9" fmla="*/ 504825 h 504834"/>
+                <a:gd name="csX10" fmla="*/ 122873 w 666750"/>
+                <a:gd name="csY10" fmla="*/ 206693 h 504834"/>
+                <a:gd name="csX11" fmla="*/ 189548 w 666750"/>
+                <a:gd name="csY11" fmla="*/ 161925 h 504834"/>
+              </a:gdLst>
+              <a:ahLst/>
+              <a:cxnLst>
+                <a:cxn ang="0">
+                  <a:pos x="csX0" y="csY0"/>
+                </a:cxn>
+                <a:cxn ang="0">
+                  <a:pos x="csX1" y="csY1"/>
+                </a:cxn>
+                <a:cxn ang="0">
+                  <a:pos x="csX2" y="csY2"/>
+                </a:cxn>
+                <a:cxn ang="0">
+                  <a:pos x="csX3" y="csY3"/>
+                </a:cxn>
+                <a:cxn ang="0">
+                  <a:pos x="csX4" y="csY4"/>
+                </a:cxn>
+                <a:cxn ang="0">
+                  <a:pos x="csX5" y="csY5"/>
+                </a:cxn>
+                <a:cxn ang="0">
+                  <a:pos x="csX6" y="csY6"/>
+                </a:cxn>
+                <a:cxn ang="0">
+                  <a:pos x="csX7" y="csY7"/>
+                </a:cxn>
+                <a:cxn ang="0">
+                  <a:pos x="csX8" y="csY8"/>
+                </a:cxn>
+                <a:cxn ang="0">
+                  <a:pos x="csX9" y="csY9"/>
+                </a:cxn>
+                <a:cxn ang="0">
+                  <a:pos x="csX10" y="csY10"/>
+                </a:cxn>
+                <a:cxn ang="0">
+                  <a:pos x="csX11" y="csY11"/>
+                </a:cxn>
+              </a:cxnLst>
+              <a:rect l="l" t="t" r="r" b="b"/>
+              <a:pathLst>
+                <a:path w="666750" h="504834">
+                  <a:moveTo>
+                    <a:pt x="189548" y="161925"/>
+                  </a:moveTo>
+                  <a:lnTo>
+                    <a:pt x="666750" y="161925"/>
+                  </a:lnTo>
+                  <a:lnTo>
+                    <a:pt x="666750" y="114300"/>
+                  </a:lnTo>
+                  <a:cubicBezTo>
+                    <a:pt x="666750" y="93345"/>
+                    <a:pt x="649605" y="76200"/>
+                    <a:pt x="628650" y="76200"/>
+                  </a:cubicBezTo>
+                  <a:lnTo>
+                    <a:pt x="342900" y="76200"/>
+                  </a:lnTo>
+                  <a:lnTo>
+                    <a:pt x="238125" y="6668"/>
+                  </a:lnTo>
+                  <a:cubicBezTo>
+                    <a:pt x="231458" y="2857"/>
+                    <a:pt x="224790" y="0"/>
+                    <a:pt x="217170" y="0"/>
+                  </a:cubicBezTo>
+                  <a:lnTo>
+                    <a:pt x="38100" y="0"/>
+                  </a:lnTo>
+                  <a:cubicBezTo>
+                    <a:pt x="17145" y="0"/>
+                    <a:pt x="0" y="17145"/>
+                    <a:pt x="0" y="38100"/>
+                  </a:cubicBezTo>
+                  <a:lnTo>
+                    <a:pt x="0" y="504825"/>
+                  </a:lnTo>
+                  <a:cubicBezTo>
+                    <a:pt x="0" y="506730"/>
+                    <a:pt x="122873" y="206693"/>
+                    <a:pt x="122873" y="206693"/>
+                  </a:cubicBezTo>
+                  <a:cubicBezTo>
+                    <a:pt x="134303" y="180023"/>
+                    <a:pt x="160020" y="161925"/>
+                    <a:pt x="189548" y="161925"/>
+                  </a:cubicBezTo>
+                  <a:close/>
+                </a:path>
+              </a:pathLst>
+            </a:custGeom>
+            <a:solidFill>
+              <a:srgbClr val="CCCCCC"/>
+            </a:solidFill>
+            <a:ln w="9525" cap="flat">
+              <a:noFill/>
+              <a:prstDash val="solid"/>
+              <a:miter/>
+            </a:ln>
+          </p:spPr>
+          <p:txBody>
+            <a:bodyPr/>
+            <a:lstStyle/>
+            <a:p>
+              <a:endParaRPr lang="fr-CA"/>
+            </a:p>
+          </p:txBody>
+        </p:sp>
+        <p:sp>
+          <p:nvSpPr>
+            <p:cNvPr id="18" name="Freeform: Shape 17">
+              <a:extLst>
+                <a:ext uri="{FF2B5EF4-FFF2-40B4-BE49-F238E27FC236}">
+                  <a16:creationId xmlns:a16="http://schemas.microsoft.com/office/drawing/2014/main" id="{62152F7B-3C4D-E2F8-909E-9837A5A87618}"/>
+                </a:ext>
+              </a:extLst>
+            </p:cNvPr>
+            <p:cNvSpPr/>
+            <p:nvPr/>
+          </p:nvSpPr>
+          <p:spPr>
+            <a:xfrm>
+              <a:off x="3764979" y="2367991"/>
+              <a:ext cx="7192570" cy="3356533"/>
+            </a:xfrm>
+            <a:custGeom>
+              <a:avLst/>
+              <a:gdLst>
+                <a:gd name="csX0" fmla="*/ 714375 w 714375"/>
+                <a:gd name="csY0" fmla="*/ 38100 h 333375"/>
+                <a:gd name="csX1" fmla="*/ 680085 w 714375"/>
+                <a:gd name="csY1" fmla="*/ 0 h 333375"/>
+                <a:gd name="csX2" fmla="*/ 160973 w 714375"/>
+                <a:gd name="csY2" fmla="*/ 0 h 333375"/>
+                <a:gd name="csX3" fmla="*/ 128588 w 714375"/>
+                <a:gd name="csY3" fmla="*/ 20955 h 333375"/>
+                <a:gd name="csX4" fmla="*/ 0 w 714375"/>
+                <a:gd name="csY4" fmla="*/ 333375 h 333375"/>
+                <a:gd name="csX5" fmla="*/ 581025 w 714375"/>
+                <a:gd name="csY5" fmla="*/ 333375 h 333375"/>
+                <a:gd name="csX6" fmla="*/ 710565 w 714375"/>
+                <a:gd name="csY6" fmla="*/ 55245 h 333375"/>
+                <a:gd name="csX7" fmla="*/ 714375 w 714375"/>
+                <a:gd name="csY7" fmla="*/ 38100 h 333375"/>
+                <a:gd name="csX8" fmla="*/ 714375 w 714375"/>
+                <a:gd name="csY8" fmla="*/ 38100 h 333375"/>
+              </a:gdLst>
+              <a:ahLst/>
+              <a:cxnLst>
+                <a:cxn ang="0">
+                  <a:pos x="csX0" y="csY0"/>
+                </a:cxn>
+                <a:cxn ang="0">
+                  <a:pos x="csX1" y="csY1"/>
+                </a:cxn>
+                <a:cxn ang="0">
+                  <a:pos x="csX2" y="csY2"/>
+                </a:cxn>
+                <a:cxn ang="0">
+                  <a:pos x="csX3" y="csY3"/>
+                </a:cxn>
+                <a:cxn ang="0">
+                  <a:pos x="csX4" y="csY4"/>
+                </a:cxn>
+                <a:cxn ang="0">
+                  <a:pos x="csX5" y="csY5"/>
+                </a:cxn>
+                <a:cxn ang="0">
+                  <a:pos x="csX6" y="csY6"/>
+                </a:cxn>
+                <a:cxn ang="0">
+                  <a:pos x="csX7" y="csY7"/>
+                </a:cxn>
+                <a:cxn ang="0">
+                  <a:pos x="csX8" y="csY8"/>
+                </a:cxn>
+              </a:cxnLst>
+              <a:rect l="l" t="t" r="r" b="b"/>
+              <a:pathLst>
+                <a:path w="714375" h="333375">
+                  <a:moveTo>
+                    <a:pt x="714375" y="38100"/>
+                  </a:moveTo>
+                  <a:cubicBezTo>
+                    <a:pt x="714375" y="18098"/>
+                    <a:pt x="700088" y="1905"/>
+                    <a:pt x="680085" y="0"/>
+                  </a:cubicBezTo>
+                  <a:lnTo>
+                    <a:pt x="160973" y="0"/>
+                  </a:lnTo>
+                  <a:cubicBezTo>
+                    <a:pt x="146685" y="0"/>
+                    <a:pt x="134303" y="8573"/>
+                    <a:pt x="128588" y="20955"/>
+                  </a:cubicBezTo>
+                  <a:lnTo>
+                    <a:pt x="0" y="333375"/>
+                  </a:lnTo>
+                  <a:lnTo>
+                    <a:pt x="581025" y="333375"/>
+                  </a:lnTo>
+                  <a:lnTo>
+                    <a:pt x="710565" y="55245"/>
+                  </a:lnTo>
+                  <a:cubicBezTo>
+                    <a:pt x="713423" y="49530"/>
+                    <a:pt x="714375" y="43815"/>
+                    <a:pt x="714375" y="38100"/>
+                  </a:cubicBezTo>
+                  <a:lnTo>
+                    <a:pt x="714375" y="38100"/>
+                  </a:lnTo>
+                  <a:close/>
+                </a:path>
+              </a:pathLst>
+            </a:custGeom>
+            <a:solidFill>
+              <a:schemeClr val="bg1"/>
+            </a:solidFill>
+            <a:ln w="9525" cap="flat">
+              <a:noFill/>
+              <a:prstDash val="solid"/>
+              <a:miter/>
+            </a:ln>
+          </p:spPr>
+          <p:txBody>
+            <a:bodyPr/>
+            <a:lstStyle/>
+            <a:p>
+              <a:endParaRPr lang="fr-CA"/>
+            </a:p>
+          </p:txBody>
+        </p:sp>
+      </p:grpSp>
     </p:spTree>
     <p:extLst>
       <p:ext uri="{BB962C8B-B14F-4D97-AF65-F5344CB8AC3E}">
         <p14:creationId xmlns:p14="http://schemas.microsoft.com/office/powerpoint/2010/main" val="603778871"/>
+      </p:ext>
+    </p:extLst>
+  </p:cSld>
+  <p:clrMapOvr>
+    <a:masterClrMapping/>
+  </p:clrMapOvr>
+</p:sld>
+</file>
+
+<file path=ppt/slides/slide3.xml><?xml version="1.0" encoding="utf-8"?>
+<p:sld xmlns:a="http://schemas.openxmlformats.org/drawingml/2006/main" xmlns:r="http://schemas.openxmlformats.org/officeDocument/2006/relationships" xmlns:p="http://schemas.openxmlformats.org/presentationml/2006/main">
+  <p:cSld>
+    <p:bg>
+      <p:bgPr>
+        <a:solidFill>
+          <a:srgbClr val="444444"/>
+        </a:solidFill>
+        <a:effectLst/>
+      </p:bgPr>
+    </p:bg>
+    <p:spTree>
+      <p:nvGrpSpPr>
+        <p:cNvPr id="1" name="">
+          <a:extLst>
+            <a:ext uri="{FF2B5EF4-FFF2-40B4-BE49-F238E27FC236}">
+              <a16:creationId xmlns:a16="http://schemas.microsoft.com/office/drawing/2014/main" id="{B8A7F415-8A09-87F1-31A3-5B8B6B7DE6D2}"/>
+            </a:ext>
+          </a:extLst>
+        </p:cNvPr>
+        <p:cNvGrpSpPr/>
+        <p:nvPr/>
+      </p:nvGrpSpPr>
+      <p:grpSpPr>
+        <a:xfrm>
+          <a:off x="0" y="0"/>
+          <a:ext cx="0" cy="0"/>
+          <a:chOff x="0" y="0"/>
+          <a:chExt cx="0" cy="0"/>
+        </a:xfrm>
+      </p:grpSpPr>
+      <p:sp>
+        <p:nvSpPr>
+          <p:cNvPr id="23" name="Freeform: Shape 22">
+            <a:extLst>
+              <a:ext uri="{FF2B5EF4-FFF2-40B4-BE49-F238E27FC236}">
+                <a16:creationId xmlns:a16="http://schemas.microsoft.com/office/drawing/2014/main" id="{DF2A6E15-DACC-7839-7B83-DECE9A7A45F1}"/>
+              </a:ext>
+            </a:extLst>
+          </p:cNvPr>
+          <p:cNvSpPr/>
+          <p:nvPr/>
+        </p:nvSpPr>
+        <p:spPr>
+          <a:xfrm>
+            <a:off x="4386898" y="2936525"/>
+            <a:ext cx="969231" cy="733860"/>
+          </a:xfrm>
+          <a:custGeom>
+            <a:avLst/>
+            <a:gdLst>
+              <a:gd name="csX0" fmla="*/ 189548 w 666750"/>
+              <a:gd name="csY0" fmla="*/ 161925 h 504834"/>
+              <a:gd name="csX1" fmla="*/ 666750 w 666750"/>
+              <a:gd name="csY1" fmla="*/ 161925 h 504834"/>
+              <a:gd name="csX2" fmla="*/ 666750 w 666750"/>
+              <a:gd name="csY2" fmla="*/ 114300 h 504834"/>
+              <a:gd name="csX3" fmla="*/ 628650 w 666750"/>
+              <a:gd name="csY3" fmla="*/ 76200 h 504834"/>
+              <a:gd name="csX4" fmla="*/ 342900 w 666750"/>
+              <a:gd name="csY4" fmla="*/ 76200 h 504834"/>
+              <a:gd name="csX5" fmla="*/ 238125 w 666750"/>
+              <a:gd name="csY5" fmla="*/ 6668 h 504834"/>
+              <a:gd name="csX6" fmla="*/ 217170 w 666750"/>
+              <a:gd name="csY6" fmla="*/ 0 h 504834"/>
+              <a:gd name="csX7" fmla="*/ 38100 w 666750"/>
+              <a:gd name="csY7" fmla="*/ 0 h 504834"/>
+              <a:gd name="csX8" fmla="*/ 0 w 666750"/>
+              <a:gd name="csY8" fmla="*/ 38100 h 504834"/>
+              <a:gd name="csX9" fmla="*/ 0 w 666750"/>
+              <a:gd name="csY9" fmla="*/ 504825 h 504834"/>
+              <a:gd name="csX10" fmla="*/ 122873 w 666750"/>
+              <a:gd name="csY10" fmla="*/ 206693 h 504834"/>
+              <a:gd name="csX11" fmla="*/ 189548 w 666750"/>
+              <a:gd name="csY11" fmla="*/ 161925 h 504834"/>
+            </a:gdLst>
+            <a:ahLst/>
+            <a:cxnLst>
+              <a:cxn ang="0">
+                <a:pos x="csX0" y="csY0"/>
+              </a:cxn>
+              <a:cxn ang="0">
+                <a:pos x="csX1" y="csY1"/>
+              </a:cxn>
+              <a:cxn ang="0">
+                <a:pos x="csX2" y="csY2"/>
+              </a:cxn>
+              <a:cxn ang="0">
+                <a:pos x="csX3" y="csY3"/>
+              </a:cxn>
+              <a:cxn ang="0">
+                <a:pos x="csX4" y="csY4"/>
+              </a:cxn>
+              <a:cxn ang="0">
+                <a:pos x="csX5" y="csY5"/>
+              </a:cxn>
+              <a:cxn ang="0">
+                <a:pos x="csX6" y="csY6"/>
+              </a:cxn>
+              <a:cxn ang="0">
+                <a:pos x="csX7" y="csY7"/>
+              </a:cxn>
+              <a:cxn ang="0">
+                <a:pos x="csX8" y="csY8"/>
+              </a:cxn>
+              <a:cxn ang="0">
+                <a:pos x="csX9" y="csY9"/>
+              </a:cxn>
+              <a:cxn ang="0">
+                <a:pos x="csX10" y="csY10"/>
+              </a:cxn>
+              <a:cxn ang="0">
+                <a:pos x="csX11" y="csY11"/>
+              </a:cxn>
+            </a:cxnLst>
+            <a:rect l="l" t="t" r="r" b="b"/>
+            <a:pathLst>
+              <a:path w="666750" h="504834">
+                <a:moveTo>
+                  <a:pt x="189548" y="161925"/>
+                </a:moveTo>
+                <a:lnTo>
+                  <a:pt x="666750" y="161925"/>
+                </a:lnTo>
+                <a:lnTo>
+                  <a:pt x="666750" y="114300"/>
+                </a:lnTo>
+                <a:cubicBezTo>
+                  <a:pt x="666750" y="93345"/>
+                  <a:pt x="649605" y="76200"/>
+                  <a:pt x="628650" y="76200"/>
+                </a:cubicBezTo>
+                <a:lnTo>
+                  <a:pt x="342900" y="76200"/>
+                </a:lnTo>
+                <a:lnTo>
+                  <a:pt x="238125" y="6668"/>
+                </a:lnTo>
+                <a:cubicBezTo>
+                  <a:pt x="231458" y="2857"/>
+                  <a:pt x="224790" y="0"/>
+                  <a:pt x="217170" y="0"/>
+                </a:cubicBezTo>
+                <a:lnTo>
+                  <a:pt x="38100" y="0"/>
+                </a:lnTo>
+                <a:cubicBezTo>
+                  <a:pt x="17145" y="0"/>
+                  <a:pt x="0" y="17145"/>
+                  <a:pt x="0" y="38100"/>
+                </a:cubicBezTo>
+                <a:lnTo>
+                  <a:pt x="0" y="504825"/>
+                </a:lnTo>
+                <a:cubicBezTo>
+                  <a:pt x="0" y="506730"/>
+                  <a:pt x="122873" y="206693"/>
+                  <a:pt x="122873" y="206693"/>
+                </a:cubicBezTo>
+                <a:cubicBezTo>
+                  <a:pt x="134303" y="180023"/>
+                  <a:pt x="160020" y="161925"/>
+                  <a:pt x="189548" y="161925"/>
+                </a:cubicBezTo>
+                <a:close/>
+              </a:path>
+            </a:pathLst>
+          </a:custGeom>
+          <a:solidFill>
+            <a:srgbClr val="999999"/>
+          </a:solidFill>
+          <a:ln w="9525" cap="flat">
+            <a:noFill/>
+            <a:prstDash val="solid"/>
+            <a:miter/>
+          </a:ln>
+        </p:spPr>
+        <p:txBody>
+          <a:bodyPr/>
+          <a:lstStyle/>
+          <a:p>
+            <a:endParaRPr lang="fr-CA" dirty="0"/>
+          </a:p>
+        </p:txBody>
+      </p:sp>
+      <p:grpSp>
+        <p:nvGrpSpPr>
+          <p:cNvPr id="9" name="Group 8">
+            <a:extLst>
+              <a:ext uri="{FF2B5EF4-FFF2-40B4-BE49-F238E27FC236}">
+                <a16:creationId xmlns:a16="http://schemas.microsoft.com/office/drawing/2014/main" id="{341569D8-EFF3-0B82-3821-A4CAE20CCBDE}"/>
+              </a:ext>
+            </a:extLst>
+          </p:cNvPr>
+          <p:cNvGrpSpPr/>
+          <p:nvPr/>
+        </p:nvGrpSpPr>
+        <p:grpSpPr>
+          <a:xfrm rot="706775">
+            <a:off x="4702531" y="1686599"/>
+            <a:ext cx="660515" cy="852277"/>
+            <a:chOff x="7639356" y="1399046"/>
+            <a:chExt cx="1671791" cy="2157150"/>
+          </a:xfrm>
+        </p:grpSpPr>
+        <p:sp>
+          <p:nvSpPr>
+            <p:cNvPr id="16" name="Freeform: Shape 15">
+              <a:extLst>
+                <a:ext uri="{FF2B5EF4-FFF2-40B4-BE49-F238E27FC236}">
+                  <a16:creationId xmlns:a16="http://schemas.microsoft.com/office/drawing/2014/main" id="{FEAAFE98-CE4C-AEB2-AE96-6655715A708E}"/>
+                </a:ext>
+              </a:extLst>
+            </p:cNvPr>
+            <p:cNvSpPr/>
+            <p:nvPr/>
+          </p:nvSpPr>
+          <p:spPr>
+            <a:xfrm>
+              <a:off x="7698658" y="1435510"/>
+              <a:ext cx="1543665" cy="2035277"/>
+            </a:xfrm>
+            <a:custGeom>
+              <a:avLst/>
+              <a:gdLst>
+                <a:gd name="csX0" fmla="*/ 9832 w 1543665"/>
+                <a:gd name="csY0" fmla="*/ 0 h 2035277"/>
+                <a:gd name="csX1" fmla="*/ 9832 w 1543665"/>
+                <a:gd name="csY1" fmla="*/ 0 h 2035277"/>
+                <a:gd name="csX2" fmla="*/ 88490 w 1543665"/>
+                <a:gd name="csY2" fmla="*/ 39329 h 2035277"/>
+                <a:gd name="csX3" fmla="*/ 511277 w 1543665"/>
+                <a:gd name="csY3" fmla="*/ 78658 h 2035277"/>
+                <a:gd name="csX4" fmla="*/ 825910 w 1543665"/>
+                <a:gd name="csY4" fmla="*/ 58993 h 2035277"/>
+                <a:gd name="csX5" fmla="*/ 914400 w 1543665"/>
+                <a:gd name="csY5" fmla="*/ 78658 h 2035277"/>
+                <a:gd name="csX6" fmla="*/ 943897 w 1543665"/>
+                <a:gd name="csY6" fmla="*/ 68825 h 2035277"/>
+                <a:gd name="csX7" fmla="*/ 1022555 w 1543665"/>
+                <a:gd name="csY7" fmla="*/ 58993 h 2035277"/>
+                <a:gd name="csX8" fmla="*/ 943897 w 1543665"/>
+                <a:gd name="csY8" fmla="*/ 589935 h 2035277"/>
+                <a:gd name="csX9" fmla="*/ 1533832 w 1543665"/>
+                <a:gd name="csY9" fmla="*/ 609600 h 2035277"/>
+                <a:gd name="csX10" fmla="*/ 1543665 w 1543665"/>
+                <a:gd name="csY10" fmla="*/ 2025445 h 2035277"/>
+                <a:gd name="csX11" fmla="*/ 0 w 1543665"/>
+                <a:gd name="csY11" fmla="*/ 2035277 h 2035277"/>
+                <a:gd name="csX12" fmla="*/ 19665 w 1543665"/>
+                <a:gd name="csY12" fmla="*/ 117987 h 2035277"/>
+              </a:gdLst>
+              <a:ahLst/>
+              <a:cxnLst>
+                <a:cxn ang="0">
+                  <a:pos x="csX0" y="csY0"/>
+                </a:cxn>
+                <a:cxn ang="0">
+                  <a:pos x="csX1" y="csY1"/>
+                </a:cxn>
+                <a:cxn ang="0">
+                  <a:pos x="csX2" y="csY2"/>
+                </a:cxn>
+                <a:cxn ang="0">
+                  <a:pos x="csX3" y="csY3"/>
+                </a:cxn>
+                <a:cxn ang="0">
+                  <a:pos x="csX4" y="csY4"/>
+                </a:cxn>
+                <a:cxn ang="0">
+                  <a:pos x="csX5" y="csY5"/>
+                </a:cxn>
+                <a:cxn ang="0">
+                  <a:pos x="csX6" y="csY6"/>
+                </a:cxn>
+                <a:cxn ang="0">
+                  <a:pos x="csX7" y="csY7"/>
+                </a:cxn>
+                <a:cxn ang="0">
+                  <a:pos x="csX8" y="csY8"/>
+                </a:cxn>
+                <a:cxn ang="0">
+                  <a:pos x="csX9" y="csY9"/>
+                </a:cxn>
+                <a:cxn ang="0">
+                  <a:pos x="csX10" y="csY10"/>
+                </a:cxn>
+                <a:cxn ang="0">
+                  <a:pos x="csX11" y="csY11"/>
+                </a:cxn>
+                <a:cxn ang="0">
+                  <a:pos x="csX12" y="csY12"/>
+                </a:cxn>
+              </a:cxnLst>
+              <a:rect l="l" t="t" r="r" b="b"/>
+              <a:pathLst>
+                <a:path w="1543665" h="2035277">
+                  <a:moveTo>
+                    <a:pt x="9832" y="0"/>
+                  </a:moveTo>
+                  <a:lnTo>
+                    <a:pt x="9832" y="0"/>
+                  </a:lnTo>
+                  <a:cubicBezTo>
+                    <a:pt x="36051" y="13110"/>
+                    <a:pt x="60680" y="30059"/>
+                    <a:pt x="88490" y="39329"/>
+                  </a:cubicBezTo>
+                  <a:cubicBezTo>
+                    <a:pt x="235693" y="88396"/>
+                    <a:pt x="344663" y="73104"/>
+                    <a:pt x="511277" y="78658"/>
+                  </a:cubicBezTo>
+                  <a:cubicBezTo>
+                    <a:pt x="616155" y="72103"/>
+                    <a:pt x="720866" y="61832"/>
+                    <a:pt x="825910" y="58993"/>
+                  </a:cubicBezTo>
+                  <a:cubicBezTo>
+                    <a:pt x="837179" y="58688"/>
+                    <a:pt x="900213" y="75111"/>
+                    <a:pt x="914400" y="78658"/>
+                  </a:cubicBezTo>
+                  <a:cubicBezTo>
+                    <a:pt x="924232" y="75380"/>
+                    <a:pt x="933700" y="70679"/>
+                    <a:pt x="943897" y="68825"/>
+                  </a:cubicBezTo>
+                  <a:cubicBezTo>
+                    <a:pt x="969894" y="64098"/>
+                    <a:pt x="1022555" y="58993"/>
+                    <a:pt x="1022555" y="58993"/>
+                  </a:cubicBezTo>
+                  <a:lnTo>
+                    <a:pt x="943897" y="589935"/>
+                  </a:lnTo>
+                  <a:lnTo>
+                    <a:pt x="1533832" y="609600"/>
+                  </a:lnTo>
+                  <a:cubicBezTo>
+                    <a:pt x="1537110" y="1081548"/>
+                    <a:pt x="1540387" y="1553497"/>
+                    <a:pt x="1543665" y="2025445"/>
+                  </a:cubicBezTo>
+                  <a:lnTo>
+                    <a:pt x="0" y="2035277"/>
+                  </a:lnTo>
+                  <a:lnTo>
+                    <a:pt x="19665" y="117987"/>
+                  </a:lnTo>
+                </a:path>
+              </a:pathLst>
+            </a:custGeom>
+            <a:solidFill>
+              <a:schemeClr val="bg1"/>
+            </a:solidFill>
+          </p:spPr>
+          <p:style>
+            <a:lnRef idx="2">
+              <a:schemeClr val="accent1">
+                <a:shade val="15000"/>
+              </a:schemeClr>
+            </a:lnRef>
+            <a:fillRef idx="1">
+              <a:schemeClr val="accent1"/>
+            </a:fillRef>
+            <a:effectRef idx="0">
+              <a:schemeClr val="accent1"/>
+            </a:effectRef>
+            <a:fontRef idx="minor">
+              <a:schemeClr val="lt1"/>
+            </a:fontRef>
+          </p:style>
+          <p:txBody>
+            <a:bodyPr rtlCol="0" anchor="ctr"/>
+            <a:lstStyle/>
+            <a:p>
+              <a:pPr algn="ctr"/>
+              <a:endParaRPr lang="fr-CA"/>
+            </a:p>
+          </p:txBody>
+        </p:sp>
+        <p:sp>
+          <p:nvSpPr>
+            <p:cNvPr id="17" name="Freeform: Shape 16">
+              <a:extLst>
+                <a:ext uri="{FF2B5EF4-FFF2-40B4-BE49-F238E27FC236}">
+                  <a16:creationId xmlns:a16="http://schemas.microsoft.com/office/drawing/2014/main" id="{FF70371F-2D68-12D5-55A1-16DBB0644E91}"/>
+                </a:ext>
+              </a:extLst>
+            </p:cNvPr>
+            <p:cNvSpPr/>
+            <p:nvPr/>
+          </p:nvSpPr>
+          <p:spPr>
+            <a:xfrm>
+              <a:off x="8610600" y="1473994"/>
+              <a:ext cx="588169" cy="581025"/>
+            </a:xfrm>
+            <a:custGeom>
+              <a:avLst/>
+              <a:gdLst>
+                <a:gd name="csX0" fmla="*/ 66675 w 588169"/>
+                <a:gd name="csY0" fmla="*/ 0 h 581025"/>
+                <a:gd name="csX1" fmla="*/ 588169 w 588169"/>
+                <a:gd name="csY1" fmla="*/ 514350 h 581025"/>
+                <a:gd name="csX2" fmla="*/ 0 w 588169"/>
+                <a:gd name="csY2" fmla="*/ 581025 h 581025"/>
+                <a:gd name="csX3" fmla="*/ 66675 w 588169"/>
+                <a:gd name="csY3" fmla="*/ 0 h 581025"/>
+              </a:gdLst>
+              <a:ahLst/>
+              <a:cxnLst>
+                <a:cxn ang="0">
+                  <a:pos x="csX0" y="csY0"/>
+                </a:cxn>
+                <a:cxn ang="0">
+                  <a:pos x="csX1" y="csY1"/>
+                </a:cxn>
+                <a:cxn ang="0">
+                  <a:pos x="csX2" y="csY2"/>
+                </a:cxn>
+                <a:cxn ang="0">
+                  <a:pos x="csX3" y="csY3"/>
+                </a:cxn>
+              </a:cxnLst>
+              <a:rect l="l" t="t" r="r" b="b"/>
+              <a:pathLst>
+                <a:path w="588169" h="581025">
+                  <a:moveTo>
+                    <a:pt x="66675" y="0"/>
+                  </a:moveTo>
+                  <a:lnTo>
+                    <a:pt x="588169" y="514350"/>
+                  </a:lnTo>
+                  <a:lnTo>
+                    <a:pt x="0" y="581025"/>
+                  </a:lnTo>
+                  <a:lnTo>
+                    <a:pt x="66675" y="0"/>
+                  </a:lnTo>
+                  <a:close/>
+                </a:path>
+              </a:pathLst>
+            </a:custGeom>
+            <a:solidFill>
+              <a:srgbClr val="999999"/>
+            </a:solidFill>
+            <a:ln>
+              <a:noFill/>
+            </a:ln>
+          </p:spPr>
+          <p:style>
+            <a:lnRef idx="2">
+              <a:schemeClr val="accent1">
+                <a:shade val="15000"/>
+              </a:schemeClr>
+            </a:lnRef>
+            <a:fillRef idx="1">
+              <a:schemeClr val="accent1"/>
+            </a:fillRef>
+            <a:effectRef idx="0">
+              <a:schemeClr val="accent1"/>
+            </a:effectRef>
+            <a:fontRef idx="minor">
+              <a:schemeClr val="lt1"/>
+            </a:fontRef>
+          </p:style>
+          <p:txBody>
+            <a:bodyPr rtlCol="0" anchor="ctr"/>
+            <a:lstStyle/>
+            <a:p>
+              <a:pPr algn="ctr"/>
+              <a:endParaRPr lang="fr-CA"/>
+            </a:p>
+          </p:txBody>
+        </p:sp>
+        <p:sp>
+          <p:nvSpPr>
+            <p:cNvPr id="18" name="Graphic 45" descr="Paper with solid fill">
+              <a:extLst>
+                <a:ext uri="{FF2B5EF4-FFF2-40B4-BE49-F238E27FC236}">
+                  <a16:creationId xmlns:a16="http://schemas.microsoft.com/office/drawing/2014/main" id="{E64DC5C4-4133-5634-C798-705E41122933}"/>
+                </a:ext>
+              </a:extLst>
+            </p:cNvPr>
+            <p:cNvSpPr/>
+            <p:nvPr/>
+          </p:nvSpPr>
+          <p:spPr>
+            <a:xfrm>
+              <a:off x="7639356" y="1399046"/>
+              <a:ext cx="1671791" cy="2157150"/>
+            </a:xfrm>
+            <a:custGeom>
+              <a:avLst/>
+              <a:gdLst>
+                <a:gd name="csX0" fmla="*/ 57150 w 590550"/>
+                <a:gd name="csY0" fmla="*/ 704850 h 762000"/>
+                <a:gd name="csX1" fmla="*/ 57150 w 590550"/>
+                <a:gd name="csY1" fmla="*/ 57150 h 762000"/>
+                <a:gd name="csX2" fmla="*/ 323850 w 590550"/>
+                <a:gd name="csY2" fmla="*/ 57150 h 762000"/>
+                <a:gd name="csX3" fmla="*/ 323850 w 590550"/>
+                <a:gd name="csY3" fmla="*/ 257175 h 762000"/>
+                <a:gd name="csX4" fmla="*/ 533400 w 590550"/>
+                <a:gd name="csY4" fmla="*/ 257175 h 762000"/>
+                <a:gd name="csX5" fmla="*/ 533400 w 590550"/>
+                <a:gd name="csY5" fmla="*/ 704850 h 762000"/>
+                <a:gd name="csX6" fmla="*/ 57150 w 590550"/>
+                <a:gd name="csY6" fmla="*/ 704850 h 762000"/>
+                <a:gd name="csX7" fmla="*/ 381000 w 590550"/>
+                <a:gd name="csY7" fmla="*/ 80963 h 762000"/>
+                <a:gd name="csX8" fmla="*/ 500063 w 590550"/>
+                <a:gd name="csY8" fmla="*/ 200025 h 762000"/>
+                <a:gd name="csX9" fmla="*/ 381000 w 590550"/>
+                <a:gd name="csY9" fmla="*/ 200025 h 762000"/>
+                <a:gd name="csX10" fmla="*/ 381000 w 590550"/>
+                <a:gd name="csY10" fmla="*/ 80963 h 762000"/>
+                <a:gd name="csX11" fmla="*/ 381000 w 590550"/>
+                <a:gd name="csY11" fmla="*/ 0 h 762000"/>
+                <a:gd name="csX12" fmla="*/ 0 w 590550"/>
+                <a:gd name="csY12" fmla="*/ 0 h 762000"/>
+                <a:gd name="csX13" fmla="*/ 0 w 590550"/>
+                <a:gd name="csY13" fmla="*/ 762000 h 762000"/>
+                <a:gd name="csX14" fmla="*/ 590550 w 590550"/>
+                <a:gd name="csY14" fmla="*/ 762000 h 762000"/>
+                <a:gd name="csX15" fmla="*/ 590550 w 590550"/>
+                <a:gd name="csY15" fmla="*/ 209550 h 762000"/>
+                <a:gd name="csX16" fmla="*/ 381000 w 590550"/>
+                <a:gd name="csY16" fmla="*/ 0 h 762000"/>
+              </a:gdLst>
+              <a:ahLst/>
+              <a:cxnLst>
+                <a:cxn ang="0">
+                  <a:pos x="csX0" y="csY0"/>
+                </a:cxn>
+                <a:cxn ang="0">
+                  <a:pos x="csX1" y="csY1"/>
+                </a:cxn>
+                <a:cxn ang="0">
+                  <a:pos x="csX2" y="csY2"/>
+                </a:cxn>
+                <a:cxn ang="0">
+                  <a:pos x="csX3" y="csY3"/>
+                </a:cxn>
+                <a:cxn ang="0">
+                  <a:pos x="csX4" y="csY4"/>
+                </a:cxn>
+                <a:cxn ang="0">
+                  <a:pos x="csX5" y="csY5"/>
+                </a:cxn>
+                <a:cxn ang="0">
+                  <a:pos x="csX6" y="csY6"/>
+                </a:cxn>
+                <a:cxn ang="0">
+                  <a:pos x="csX7" y="csY7"/>
+                </a:cxn>
+                <a:cxn ang="0">
+                  <a:pos x="csX8" y="csY8"/>
+                </a:cxn>
+                <a:cxn ang="0">
+                  <a:pos x="csX9" y="csY9"/>
+                </a:cxn>
+                <a:cxn ang="0">
+                  <a:pos x="csX10" y="csY10"/>
+                </a:cxn>
+                <a:cxn ang="0">
+                  <a:pos x="csX11" y="csY11"/>
+                </a:cxn>
+                <a:cxn ang="0">
+                  <a:pos x="csX12" y="csY12"/>
+                </a:cxn>
+                <a:cxn ang="0">
+                  <a:pos x="csX13" y="csY13"/>
+                </a:cxn>
+                <a:cxn ang="0">
+                  <a:pos x="csX14" y="csY14"/>
+                </a:cxn>
+                <a:cxn ang="0">
+                  <a:pos x="csX15" y="csY15"/>
+                </a:cxn>
+                <a:cxn ang="0">
+                  <a:pos x="csX16" y="csY16"/>
+                </a:cxn>
+              </a:cxnLst>
+              <a:rect l="l" t="t" r="r" b="b"/>
+              <a:pathLst>
+                <a:path w="590550" h="762000">
+                  <a:moveTo>
+                    <a:pt x="57150" y="704850"/>
+                  </a:moveTo>
+                  <a:lnTo>
+                    <a:pt x="57150" y="57150"/>
+                  </a:lnTo>
+                  <a:lnTo>
+                    <a:pt x="323850" y="57150"/>
+                  </a:lnTo>
+                  <a:lnTo>
+                    <a:pt x="323850" y="257175"/>
+                  </a:lnTo>
+                  <a:lnTo>
+                    <a:pt x="533400" y="257175"/>
+                  </a:lnTo>
+                  <a:lnTo>
+                    <a:pt x="533400" y="704850"/>
+                  </a:lnTo>
+                  <a:lnTo>
+                    <a:pt x="57150" y="704850"/>
+                  </a:lnTo>
+                  <a:close/>
+                  <a:moveTo>
+                    <a:pt x="381000" y="80963"/>
+                  </a:moveTo>
+                  <a:lnTo>
+                    <a:pt x="500063" y="200025"/>
+                  </a:lnTo>
+                  <a:lnTo>
+                    <a:pt x="381000" y="200025"/>
+                  </a:lnTo>
+                  <a:lnTo>
+                    <a:pt x="381000" y="80963"/>
+                  </a:lnTo>
+                  <a:close/>
+                  <a:moveTo>
+                    <a:pt x="381000" y="0"/>
+                  </a:moveTo>
+                  <a:lnTo>
+                    <a:pt x="0" y="0"/>
+                  </a:lnTo>
+                  <a:lnTo>
+                    <a:pt x="0" y="762000"/>
+                  </a:lnTo>
+                  <a:lnTo>
+                    <a:pt x="590550" y="762000"/>
+                  </a:lnTo>
+                  <a:lnTo>
+                    <a:pt x="590550" y="209550"/>
+                  </a:lnTo>
+                  <a:lnTo>
+                    <a:pt x="381000" y="0"/>
+                  </a:lnTo>
+                  <a:close/>
+                </a:path>
+              </a:pathLst>
+            </a:custGeom>
+            <a:solidFill>
+              <a:srgbClr val="333333"/>
+            </a:solidFill>
+            <a:ln w="9525" cap="flat">
+              <a:noFill/>
+              <a:prstDash val="solid"/>
+              <a:miter/>
+            </a:ln>
+          </p:spPr>
+          <p:txBody>
+            <a:bodyPr/>
+            <a:lstStyle/>
+            <a:p>
+              <a:endParaRPr lang="fr-CA" dirty="0"/>
+            </a:p>
+          </p:txBody>
+        </p:sp>
+      </p:grpSp>
+      <p:sp>
+        <p:nvSpPr>
+          <p:cNvPr id="24" name="Freeform: Shape 23">
+            <a:extLst>
+              <a:ext uri="{FF2B5EF4-FFF2-40B4-BE49-F238E27FC236}">
+                <a16:creationId xmlns:a16="http://schemas.microsoft.com/office/drawing/2014/main" id="{963CCA2A-3B34-4E23-560B-85ACA9F23197}"/>
+              </a:ext>
+            </a:extLst>
+          </p:cNvPr>
+          <p:cNvSpPr/>
+          <p:nvPr/>
+        </p:nvSpPr>
+        <p:spPr>
+          <a:xfrm>
+            <a:off x="4428436" y="3227294"/>
+            <a:ext cx="1038462" cy="484616"/>
+          </a:xfrm>
+          <a:custGeom>
+            <a:avLst/>
+            <a:gdLst>
+              <a:gd name="csX0" fmla="*/ 714375 w 714375"/>
+              <a:gd name="csY0" fmla="*/ 38100 h 333375"/>
+              <a:gd name="csX1" fmla="*/ 680085 w 714375"/>
+              <a:gd name="csY1" fmla="*/ 0 h 333375"/>
+              <a:gd name="csX2" fmla="*/ 160973 w 714375"/>
+              <a:gd name="csY2" fmla="*/ 0 h 333375"/>
+              <a:gd name="csX3" fmla="*/ 128588 w 714375"/>
+              <a:gd name="csY3" fmla="*/ 20955 h 333375"/>
+              <a:gd name="csX4" fmla="*/ 0 w 714375"/>
+              <a:gd name="csY4" fmla="*/ 333375 h 333375"/>
+              <a:gd name="csX5" fmla="*/ 581025 w 714375"/>
+              <a:gd name="csY5" fmla="*/ 333375 h 333375"/>
+              <a:gd name="csX6" fmla="*/ 710565 w 714375"/>
+              <a:gd name="csY6" fmla="*/ 55245 h 333375"/>
+              <a:gd name="csX7" fmla="*/ 714375 w 714375"/>
+              <a:gd name="csY7" fmla="*/ 38100 h 333375"/>
+              <a:gd name="csX8" fmla="*/ 714375 w 714375"/>
+              <a:gd name="csY8" fmla="*/ 38100 h 333375"/>
+            </a:gdLst>
+            <a:ahLst/>
+            <a:cxnLst>
+              <a:cxn ang="0">
+                <a:pos x="csX0" y="csY0"/>
+              </a:cxn>
+              <a:cxn ang="0">
+                <a:pos x="csX1" y="csY1"/>
+              </a:cxn>
+              <a:cxn ang="0">
+                <a:pos x="csX2" y="csY2"/>
+              </a:cxn>
+              <a:cxn ang="0">
+                <a:pos x="csX3" y="csY3"/>
+              </a:cxn>
+              <a:cxn ang="0">
+                <a:pos x="csX4" y="csY4"/>
+              </a:cxn>
+              <a:cxn ang="0">
+                <a:pos x="csX5" y="csY5"/>
+              </a:cxn>
+              <a:cxn ang="0">
+                <a:pos x="csX6" y="csY6"/>
+              </a:cxn>
+              <a:cxn ang="0">
+                <a:pos x="csX7" y="csY7"/>
+              </a:cxn>
+              <a:cxn ang="0">
+                <a:pos x="csX8" y="csY8"/>
+              </a:cxn>
+            </a:cxnLst>
+            <a:rect l="l" t="t" r="r" b="b"/>
+            <a:pathLst>
+              <a:path w="714375" h="333375">
+                <a:moveTo>
+                  <a:pt x="714375" y="38100"/>
+                </a:moveTo>
+                <a:cubicBezTo>
+                  <a:pt x="714375" y="18098"/>
+                  <a:pt x="700088" y="1905"/>
+                  <a:pt x="680085" y="0"/>
+                </a:cubicBezTo>
+                <a:lnTo>
+                  <a:pt x="160973" y="0"/>
+                </a:lnTo>
+                <a:cubicBezTo>
+                  <a:pt x="146685" y="0"/>
+                  <a:pt x="134303" y="8573"/>
+                  <a:pt x="128588" y="20955"/>
+                </a:cubicBezTo>
+                <a:lnTo>
+                  <a:pt x="0" y="333375"/>
+                </a:lnTo>
+                <a:lnTo>
+                  <a:pt x="581025" y="333375"/>
+                </a:lnTo>
+                <a:lnTo>
+                  <a:pt x="710565" y="55245"/>
+                </a:lnTo>
+                <a:cubicBezTo>
+                  <a:pt x="713423" y="49530"/>
+                  <a:pt x="714375" y="43815"/>
+                  <a:pt x="714375" y="38100"/>
+                </a:cubicBezTo>
+                <a:lnTo>
+                  <a:pt x="714375" y="38100"/>
+                </a:lnTo>
+                <a:close/>
+              </a:path>
+            </a:pathLst>
+          </a:custGeom>
+          <a:solidFill>
+            <a:srgbClr val="CCCCCC"/>
+          </a:solidFill>
+          <a:ln w="9525" cap="flat">
+            <a:noFill/>
+            <a:prstDash val="solid"/>
+            <a:miter/>
+          </a:ln>
+        </p:spPr>
+        <p:txBody>
+          <a:bodyPr/>
+          <a:lstStyle/>
+          <a:p>
+            <a:endParaRPr lang="fr-CA" dirty="0"/>
+          </a:p>
+        </p:txBody>
+      </p:sp>
+      <p:grpSp>
+        <p:nvGrpSpPr>
+          <p:cNvPr id="30" name="Group 29">
+            <a:extLst>
+              <a:ext uri="{FF2B5EF4-FFF2-40B4-BE49-F238E27FC236}">
+                <a16:creationId xmlns:a16="http://schemas.microsoft.com/office/drawing/2014/main" id="{8978D270-AAE2-0742-91AC-F28EAFDD4777}"/>
+              </a:ext>
+            </a:extLst>
+          </p:cNvPr>
+          <p:cNvGrpSpPr/>
+          <p:nvPr/>
+        </p:nvGrpSpPr>
+        <p:grpSpPr>
+          <a:xfrm>
+            <a:off x="7707494" y="2865508"/>
+            <a:ext cx="1038462" cy="846402"/>
+            <a:chOff x="7707494" y="2865508"/>
+            <a:chExt cx="1038462" cy="846402"/>
+          </a:xfrm>
+        </p:grpSpPr>
+        <p:sp>
+          <p:nvSpPr>
+            <p:cNvPr id="27" name="Rectangle: Top Corners Rounded 26">
+              <a:extLst>
+                <a:ext uri="{FF2B5EF4-FFF2-40B4-BE49-F238E27FC236}">
+                  <a16:creationId xmlns:a16="http://schemas.microsoft.com/office/drawing/2014/main" id="{2E72C2A3-EFFD-91D2-ECDF-BB9F5D03C957}"/>
+                </a:ext>
+              </a:extLst>
+            </p:cNvPr>
+            <p:cNvSpPr/>
+            <p:nvPr/>
+          </p:nvSpPr>
+          <p:spPr>
+            <a:xfrm>
+              <a:off x="7707494" y="3147653"/>
+              <a:ext cx="841194" cy="564257"/>
+            </a:xfrm>
+            <a:prstGeom prst="round2SameRect">
+              <a:avLst/>
+            </a:prstGeom>
+            <a:solidFill>
+              <a:srgbClr val="333333"/>
+            </a:solidFill>
+            <a:ln>
+              <a:noFill/>
+            </a:ln>
+          </p:spPr>
+          <p:style>
+            <a:lnRef idx="2">
+              <a:schemeClr val="accent1">
+                <a:shade val="15000"/>
+              </a:schemeClr>
+            </a:lnRef>
+            <a:fillRef idx="1">
+              <a:schemeClr val="accent1"/>
+            </a:fillRef>
+            <a:effectRef idx="0">
+              <a:schemeClr val="accent1"/>
+            </a:effectRef>
+            <a:fontRef idx="minor">
+              <a:schemeClr val="lt1"/>
+            </a:fontRef>
+          </p:style>
+          <p:txBody>
+            <a:bodyPr rtlCol="0" anchor="ctr"/>
+            <a:lstStyle/>
+            <a:p>
+              <a:pPr algn="ctr"/>
+              <a:endParaRPr lang="fr-CA"/>
+            </a:p>
+          </p:txBody>
+        </p:sp>
+        <p:sp>
+          <p:nvSpPr>
+            <p:cNvPr id="28" name="Rectangle 27">
+              <a:extLst>
+                <a:ext uri="{FF2B5EF4-FFF2-40B4-BE49-F238E27FC236}">
+                  <a16:creationId xmlns:a16="http://schemas.microsoft.com/office/drawing/2014/main" id="{20904508-24B5-230B-3F63-24F693C5C438}"/>
+                </a:ext>
+              </a:extLst>
+            </p:cNvPr>
+            <p:cNvSpPr/>
+            <p:nvPr/>
+          </p:nvSpPr>
+          <p:spPr>
+            <a:xfrm>
+              <a:off x="7806128" y="2865508"/>
+              <a:ext cx="841194" cy="649582"/>
+            </a:xfrm>
+            <a:prstGeom prst="rect">
+              <a:avLst/>
+            </a:prstGeom>
+            <a:solidFill>
+              <a:schemeClr val="bg1"/>
+            </a:solidFill>
+            <a:ln>
+              <a:noFill/>
+            </a:ln>
+          </p:spPr>
+          <p:style>
+            <a:lnRef idx="2">
+              <a:schemeClr val="accent1">
+                <a:shade val="15000"/>
+              </a:schemeClr>
+            </a:lnRef>
+            <a:fillRef idx="1">
+              <a:schemeClr val="accent1"/>
+            </a:fillRef>
+            <a:effectRef idx="0">
+              <a:schemeClr val="accent1"/>
+            </a:effectRef>
+            <a:fontRef idx="minor">
+              <a:schemeClr val="lt1"/>
+            </a:fontRef>
+          </p:style>
+          <p:txBody>
+            <a:bodyPr rtlCol="0" anchor="ctr"/>
+            <a:lstStyle/>
+            <a:p>
+              <a:pPr algn="ctr"/>
+              <a:endParaRPr lang="fr-CA"/>
+            </a:p>
+          </p:txBody>
+        </p:sp>
+        <p:sp>
+          <p:nvSpPr>
+            <p:cNvPr id="29" name="Arrow: Up 28">
+              <a:extLst>
+                <a:ext uri="{FF2B5EF4-FFF2-40B4-BE49-F238E27FC236}">
+                  <a16:creationId xmlns:a16="http://schemas.microsoft.com/office/drawing/2014/main" id="{3FFA69AB-7551-6965-F14A-676B2EBF9FB9}"/>
+                </a:ext>
+              </a:extLst>
+            </p:cNvPr>
+            <p:cNvSpPr/>
+            <p:nvPr/>
+          </p:nvSpPr>
+          <p:spPr>
+            <a:xfrm>
+              <a:off x="8043629" y="2964253"/>
+              <a:ext cx="402462" cy="339202"/>
+            </a:xfrm>
+            <a:prstGeom prst="upArrow">
+              <a:avLst/>
+            </a:prstGeom>
+            <a:solidFill>
+              <a:srgbClr val="CCCCCC"/>
+            </a:solidFill>
+            <a:ln>
+              <a:noFill/>
+            </a:ln>
+          </p:spPr>
+          <p:style>
+            <a:lnRef idx="2">
+              <a:schemeClr val="accent1">
+                <a:shade val="15000"/>
+              </a:schemeClr>
+            </a:lnRef>
+            <a:fillRef idx="1">
+              <a:schemeClr val="accent1"/>
+            </a:fillRef>
+            <a:effectRef idx="0">
+              <a:schemeClr val="accent1"/>
+            </a:effectRef>
+            <a:fontRef idx="minor">
+              <a:schemeClr val="lt1"/>
+            </a:fontRef>
+          </p:style>
+          <p:txBody>
+            <a:bodyPr rtlCol="0" anchor="ctr"/>
+            <a:lstStyle/>
+            <a:p>
+              <a:pPr algn="ctr"/>
+              <a:endParaRPr lang="fr-CA"/>
+            </a:p>
+          </p:txBody>
+        </p:sp>
+        <p:sp>
+          <p:nvSpPr>
+            <p:cNvPr id="25" name="Freeform: Shape 24">
+              <a:extLst>
+                <a:ext uri="{FF2B5EF4-FFF2-40B4-BE49-F238E27FC236}">
+                  <a16:creationId xmlns:a16="http://schemas.microsoft.com/office/drawing/2014/main" id="{8A12396A-ED01-0899-EA47-49ECB1F3E4E8}"/>
+                </a:ext>
+              </a:extLst>
+            </p:cNvPr>
+            <p:cNvSpPr/>
+            <p:nvPr/>
+          </p:nvSpPr>
+          <p:spPr>
+            <a:xfrm>
+              <a:off x="7707494" y="3227294"/>
+              <a:ext cx="1038462" cy="484616"/>
+            </a:xfrm>
+            <a:custGeom>
+              <a:avLst/>
+              <a:gdLst>
+                <a:gd name="csX0" fmla="*/ 714375 w 714375"/>
+                <a:gd name="csY0" fmla="*/ 38100 h 333375"/>
+                <a:gd name="csX1" fmla="*/ 680085 w 714375"/>
+                <a:gd name="csY1" fmla="*/ 0 h 333375"/>
+                <a:gd name="csX2" fmla="*/ 160973 w 714375"/>
+                <a:gd name="csY2" fmla="*/ 0 h 333375"/>
+                <a:gd name="csX3" fmla="*/ 128588 w 714375"/>
+                <a:gd name="csY3" fmla="*/ 20955 h 333375"/>
+                <a:gd name="csX4" fmla="*/ 0 w 714375"/>
+                <a:gd name="csY4" fmla="*/ 333375 h 333375"/>
+                <a:gd name="csX5" fmla="*/ 581025 w 714375"/>
+                <a:gd name="csY5" fmla="*/ 333375 h 333375"/>
+                <a:gd name="csX6" fmla="*/ 710565 w 714375"/>
+                <a:gd name="csY6" fmla="*/ 55245 h 333375"/>
+                <a:gd name="csX7" fmla="*/ 714375 w 714375"/>
+                <a:gd name="csY7" fmla="*/ 38100 h 333375"/>
+                <a:gd name="csX8" fmla="*/ 714375 w 714375"/>
+                <a:gd name="csY8" fmla="*/ 38100 h 333375"/>
+              </a:gdLst>
+              <a:ahLst/>
+              <a:cxnLst>
+                <a:cxn ang="0">
+                  <a:pos x="csX0" y="csY0"/>
+                </a:cxn>
+                <a:cxn ang="0">
+                  <a:pos x="csX1" y="csY1"/>
+                </a:cxn>
+                <a:cxn ang="0">
+                  <a:pos x="csX2" y="csY2"/>
+                </a:cxn>
+                <a:cxn ang="0">
+                  <a:pos x="csX3" y="csY3"/>
+                </a:cxn>
+                <a:cxn ang="0">
+                  <a:pos x="csX4" y="csY4"/>
+                </a:cxn>
+                <a:cxn ang="0">
+                  <a:pos x="csX5" y="csY5"/>
+                </a:cxn>
+                <a:cxn ang="0">
+                  <a:pos x="csX6" y="csY6"/>
+                </a:cxn>
+                <a:cxn ang="0">
+                  <a:pos x="csX7" y="csY7"/>
+                </a:cxn>
+                <a:cxn ang="0">
+                  <a:pos x="csX8" y="csY8"/>
+                </a:cxn>
+              </a:cxnLst>
+              <a:rect l="l" t="t" r="r" b="b"/>
+              <a:pathLst>
+                <a:path w="714375" h="333375">
+                  <a:moveTo>
+                    <a:pt x="714375" y="38100"/>
+                  </a:moveTo>
+                  <a:cubicBezTo>
+                    <a:pt x="714375" y="18098"/>
+                    <a:pt x="700088" y="1905"/>
+                    <a:pt x="680085" y="0"/>
+                  </a:cubicBezTo>
+                  <a:lnTo>
+                    <a:pt x="160973" y="0"/>
+                  </a:lnTo>
+                  <a:cubicBezTo>
+                    <a:pt x="146685" y="0"/>
+                    <a:pt x="134303" y="8573"/>
+                    <a:pt x="128588" y="20955"/>
+                  </a:cubicBezTo>
+                  <a:lnTo>
+                    <a:pt x="0" y="333375"/>
+                  </a:lnTo>
+                  <a:lnTo>
+                    <a:pt x="581025" y="333375"/>
+                  </a:lnTo>
+                  <a:lnTo>
+                    <a:pt x="710565" y="55245"/>
+                  </a:lnTo>
+                  <a:cubicBezTo>
+                    <a:pt x="713423" y="49530"/>
+                    <a:pt x="714375" y="43815"/>
+                    <a:pt x="714375" y="38100"/>
+                  </a:cubicBezTo>
+                  <a:lnTo>
+                    <a:pt x="714375" y="38100"/>
+                  </a:lnTo>
+                  <a:close/>
+                </a:path>
+              </a:pathLst>
+            </a:custGeom>
+            <a:solidFill>
+              <a:srgbClr val="999999"/>
+            </a:solidFill>
+            <a:ln w="9525" cap="flat">
+              <a:noFill/>
+              <a:prstDash val="solid"/>
+              <a:miter/>
+            </a:ln>
+          </p:spPr>
+          <p:txBody>
+            <a:bodyPr/>
+            <a:lstStyle/>
+            <a:p>
+              <a:endParaRPr lang="fr-CA" dirty="0"/>
+            </a:p>
+          </p:txBody>
+        </p:sp>
+      </p:grpSp>
+    </p:spTree>
+    <p:extLst>
+      <p:ext uri="{BB962C8B-B14F-4D97-AF65-F5344CB8AC3E}">
+        <p14:creationId xmlns:p14="http://schemas.microsoft.com/office/powerpoint/2010/main" val="1168203940"/>
       </p:ext>
     </p:extLst>
   </p:cSld>

</xml_diff>